<commit_message>
Update Base de datos embebida h2.pptx
</commit_message>
<xml_diff>
--- a/Documentos Word y PP/Base de datos embebida h2.pptx
+++ b/Documentos Word y PP/Base de datos embebida h2.pptx
@@ -8,21 +8,22 @@
     <p:sldId id="256" r:id="rId2"/>
     <p:sldId id="257" r:id="rId3"/>
     <p:sldId id="258" r:id="rId4"/>
-    <p:sldId id="259" r:id="rId5"/>
-    <p:sldId id="260" r:id="rId6"/>
-    <p:sldId id="261" r:id="rId7"/>
-    <p:sldId id="262" r:id="rId8"/>
-    <p:sldId id="263" r:id="rId9"/>
-    <p:sldId id="264" r:id="rId10"/>
-    <p:sldId id="265" r:id="rId11"/>
-    <p:sldId id="267" r:id="rId12"/>
-    <p:sldId id="266" r:id="rId13"/>
-    <p:sldId id="268" r:id="rId14"/>
-    <p:sldId id="269" r:id="rId15"/>
-    <p:sldId id="270" r:id="rId16"/>
-    <p:sldId id="271" r:id="rId17"/>
-    <p:sldId id="272" r:id="rId18"/>
-    <p:sldId id="273" r:id="rId19"/>
+    <p:sldId id="274" r:id="rId5"/>
+    <p:sldId id="259" r:id="rId6"/>
+    <p:sldId id="260" r:id="rId7"/>
+    <p:sldId id="261" r:id="rId8"/>
+    <p:sldId id="262" r:id="rId9"/>
+    <p:sldId id="263" r:id="rId10"/>
+    <p:sldId id="264" r:id="rId11"/>
+    <p:sldId id="265" r:id="rId12"/>
+    <p:sldId id="267" r:id="rId13"/>
+    <p:sldId id="266" r:id="rId14"/>
+    <p:sldId id="268" r:id="rId15"/>
+    <p:sldId id="269" r:id="rId16"/>
+    <p:sldId id="270" r:id="rId17"/>
+    <p:sldId id="271" r:id="rId18"/>
+    <p:sldId id="272" r:id="rId19"/>
+    <p:sldId id="273" r:id="rId20"/>
   </p:sldIdLst>
   <p:sldSz cx="12192000" cy="6858000"/>
   <p:notesSz cx="6858000" cy="9144000"/>
@@ -305,7 +306,7 @@
           <a:p>
             <a:fld id="{E24286EB-C2A9-439A-98EF-AD7CC1AA2EB0}" type="datetimeFigureOut">
               <a:rPr lang="es-ES" smtClean="0"/>
-              <a:t>09/02/2022</a:t>
+              <a:t>13/02/2022</a:t>
             </a:fld>
             <a:endParaRPr lang="es-ES"/>
           </a:p>
@@ -475,7 +476,7 @@
           <a:p>
             <a:fld id="{E24286EB-C2A9-439A-98EF-AD7CC1AA2EB0}" type="datetimeFigureOut">
               <a:rPr lang="es-ES" smtClean="0"/>
-              <a:t>09/02/2022</a:t>
+              <a:t>13/02/2022</a:t>
             </a:fld>
             <a:endParaRPr lang="es-ES"/>
           </a:p>
@@ -698,7 +699,7 @@
           <a:p>
             <a:fld id="{E24286EB-C2A9-439A-98EF-AD7CC1AA2EB0}" type="datetimeFigureOut">
               <a:rPr lang="es-ES" smtClean="0"/>
-              <a:t>09/02/2022</a:t>
+              <a:t>13/02/2022</a:t>
             </a:fld>
             <a:endParaRPr lang="es-ES"/>
           </a:p>
@@ -878,7 +879,7 @@
           <a:p>
             <a:fld id="{E24286EB-C2A9-439A-98EF-AD7CC1AA2EB0}" type="datetimeFigureOut">
               <a:rPr lang="es-ES" smtClean="0"/>
-              <a:t>09/02/2022</a:t>
+              <a:t>13/02/2022</a:t>
             </a:fld>
             <a:endParaRPr lang="es-ES"/>
           </a:p>
@@ -1184,7 +1185,7 @@
           <a:p>
             <a:fld id="{E24286EB-C2A9-439A-98EF-AD7CC1AA2EB0}" type="datetimeFigureOut">
               <a:rPr lang="es-ES" smtClean="0"/>
-              <a:t>09/02/2022</a:t>
+              <a:t>13/02/2022</a:t>
             </a:fld>
             <a:endParaRPr lang="es-ES"/>
           </a:p>
@@ -1488,7 +1489,7 @@
           <a:p>
             <a:fld id="{E24286EB-C2A9-439A-98EF-AD7CC1AA2EB0}" type="datetimeFigureOut">
               <a:rPr lang="es-ES" smtClean="0"/>
-              <a:t>09/02/2022</a:t>
+              <a:t>13/02/2022</a:t>
             </a:fld>
             <a:endParaRPr lang="es-ES"/>
           </a:p>
@@ -1910,7 +1911,7 @@
           <a:p>
             <a:fld id="{E24286EB-C2A9-439A-98EF-AD7CC1AA2EB0}" type="datetimeFigureOut">
               <a:rPr lang="es-ES" smtClean="0"/>
-              <a:t>09/02/2022</a:t>
+              <a:t>13/02/2022</a:t>
             </a:fld>
             <a:endParaRPr lang="es-ES"/>
           </a:p>
@@ -2028,7 +2029,7 @@
           <a:p>
             <a:fld id="{E24286EB-C2A9-439A-98EF-AD7CC1AA2EB0}" type="datetimeFigureOut">
               <a:rPr lang="es-ES" smtClean="0"/>
-              <a:t>09/02/2022</a:t>
+              <a:t>13/02/2022</a:t>
             </a:fld>
             <a:endParaRPr lang="es-ES"/>
           </a:p>
@@ -2123,7 +2124,7 @@
           <a:p>
             <a:fld id="{E24286EB-C2A9-439A-98EF-AD7CC1AA2EB0}" type="datetimeFigureOut">
               <a:rPr lang="es-ES" smtClean="0"/>
-              <a:t>09/02/2022</a:t>
+              <a:t>13/02/2022</a:t>
             </a:fld>
             <a:endParaRPr lang="es-ES"/>
           </a:p>
@@ -2396,7 +2397,7 @@
           <a:p>
             <a:fld id="{E24286EB-C2A9-439A-98EF-AD7CC1AA2EB0}" type="datetimeFigureOut">
               <a:rPr lang="es-ES" smtClean="0"/>
-              <a:t>09/02/2022</a:t>
+              <a:t>13/02/2022</a:t>
             </a:fld>
             <a:endParaRPr lang="es-ES"/>
           </a:p>
@@ -2661,7 +2662,7 @@
           <a:p>
             <a:fld id="{E24286EB-C2A9-439A-98EF-AD7CC1AA2EB0}" type="datetimeFigureOut">
               <a:rPr lang="es-ES" smtClean="0"/>
-              <a:t>09/02/2022</a:t>
+              <a:t>13/02/2022</a:t>
             </a:fld>
             <a:endParaRPr lang="es-ES"/>
           </a:p>
@@ -2910,7 +2911,7 @@
           <a:p>
             <a:fld id="{E24286EB-C2A9-439A-98EF-AD7CC1AA2EB0}" type="datetimeFigureOut">
               <a:rPr lang="es-ES" smtClean="0"/>
-              <a:t>09/02/2022</a:t>
+              <a:t>13/02/2022</a:t>
             </a:fld>
             <a:endParaRPr lang="es-ES"/>
           </a:p>
@@ -3560,7 +3561,7 @@
           <p:cNvPr id="2" name="Título 1">
             <a:extLst>
               <a:ext uri="{FF2B5EF4-FFF2-40B4-BE49-F238E27FC236}">
-                <a16:creationId xmlns:a16="http://schemas.microsoft.com/office/drawing/2014/main" id="{B274B7FE-33CF-4C0D-BF1D-075A06ECCCAB}"/>
+                <a16:creationId xmlns:a16="http://schemas.microsoft.com/office/drawing/2014/main" id="{152712B1-5BFD-4504-A51F-5CBE8292E7CE}"/>
               </a:ext>
             </a:extLst>
           </p:cNvPr>
@@ -3578,17 +3579,17 @@
           <a:p>
             <a:r>
               <a:rPr lang="es-ES" dirty="0"/>
-              <a:t>Configurar H2 en un proyecto Maven</a:t>
-            </a:r>
-          </a:p>
-        </p:txBody>
-      </p:sp>
-      <p:sp>
-        <p:nvSpPr>
-          <p:cNvPr id="3" name="CuadroTexto 2">
-            <a:extLst>
-              <a:ext uri="{FF2B5EF4-FFF2-40B4-BE49-F238E27FC236}">
-                <a16:creationId xmlns:a16="http://schemas.microsoft.com/office/drawing/2014/main" id="{B17DD1BF-A926-4DE4-84D1-9F4839277484}"/>
+              <a:t>Métodos de arranque de la consola</a:t>
+            </a:r>
+          </a:p>
+        </p:txBody>
+      </p:sp>
+      <p:sp>
+        <p:nvSpPr>
+          <p:cNvPr id="4" name="CuadroTexto 3">
+            <a:extLst>
+              <a:ext uri="{FF2B5EF4-FFF2-40B4-BE49-F238E27FC236}">
+                <a16:creationId xmlns:a16="http://schemas.microsoft.com/office/drawing/2014/main" id="{5A00C913-5A53-4DD7-9622-A80006EE214C}"/>
               </a:ext>
             </a:extLst>
           </p:cNvPr>
@@ -3597,8 +3598,8 @@
         </p:nvSpPr>
         <p:spPr>
           <a:xfrm>
-            <a:off x="457200" y="1868337"/>
-            <a:ext cx="11375292" cy="461665"/>
+            <a:off x="181924" y="1914509"/>
+            <a:ext cx="11457751" cy="830997"/>
           </a:xfrm>
           <a:prstGeom prst="rect">
             <a:avLst/>
@@ -3613,17 +3614,17 @@
           <a:p>
             <a:r>
               <a:rPr lang="es-ES" sz="2400" dirty="0"/>
-              <a:t>En el caso de un proyecto Maven, podremos estas dependencias en nuestro pom.xml:</a:t>
+              <a:t>Cualquiera de las formas que uses, se debería abrir una ventana en nuestro navegador principal como esta:</a:t>
             </a:r>
           </a:p>
         </p:txBody>
       </p:sp>
       <p:pic>
         <p:nvPicPr>
-          <p:cNvPr id="5" name="Imagen 4">
-            <a:extLst>
-              <a:ext uri="{FF2B5EF4-FFF2-40B4-BE49-F238E27FC236}">
-                <a16:creationId xmlns:a16="http://schemas.microsoft.com/office/drawing/2014/main" id="{F5901E75-625B-44A8-AF50-18FA18025ADC}"/>
+          <p:cNvPr id="9" name="Imagen 8">
+            <a:extLst>
+              <a:ext uri="{FF2B5EF4-FFF2-40B4-BE49-F238E27FC236}">
+                <a16:creationId xmlns:a16="http://schemas.microsoft.com/office/drawing/2014/main" id="{96AE7E4D-470D-4182-AD46-DF1E17FE9B67}"/>
               </a:ext>
             </a:extLst>
           </p:cNvPr>
@@ -3634,17 +3635,17 @@
         </p:nvPicPr>
         <p:blipFill rotWithShape="1">
           <a:blip r:embed="rId2"/>
-          <a:srcRect t="45535"/>
+          <a:srcRect l="1009"/>
           <a:stretch/>
         </p:blipFill>
         <p:spPr>
           <a:xfrm>
-            <a:off x="3180346" y="2527377"/>
-            <a:ext cx="5159187" cy="1232723"/>
+            <a:off x="3619892" y="2745506"/>
+            <a:ext cx="4581816" cy="3905105"/>
           </a:xfrm>
           <a:prstGeom prst="roundRect">
             <a:avLst>
-              <a:gd name="adj" fmla="val 3069"/>
+              <a:gd name="adj" fmla="val 8594"/>
             </a:avLst>
           </a:prstGeom>
           <a:solidFill>
@@ -3660,53 +3661,10 @@
           </a:effectLst>
         </p:spPr>
       </p:pic>
-      <p:sp>
-        <p:nvSpPr>
-          <p:cNvPr id="6" name="CuadroTexto 5">
-            <a:extLst>
-              <a:ext uri="{FF2B5EF4-FFF2-40B4-BE49-F238E27FC236}">
-                <a16:creationId xmlns:a16="http://schemas.microsoft.com/office/drawing/2014/main" id="{70D60588-0649-4326-A4ED-AD6682160212}"/>
-              </a:ext>
-            </a:extLst>
-          </p:cNvPr>
-          <p:cNvSpPr txBox="1"/>
-          <p:nvPr/>
-        </p:nvSpPr>
-        <p:spPr>
-          <a:xfrm>
-            <a:off x="336061" y="4297166"/>
-            <a:ext cx="11375292" cy="461665"/>
-          </a:xfrm>
-          <a:prstGeom prst="rect">
-            <a:avLst/>
-          </a:prstGeom>
-          <a:noFill/>
-        </p:spPr>
-        <p:txBody>
-          <a:bodyPr wrap="square" rtlCol="0">
-            <a:spAutoFit/>
-          </a:bodyPr>
-          <a:lstStyle/>
-          <a:p>
-            <a:r>
-              <a:rPr lang="es-ES" sz="2400" dirty="0"/>
-              <a:t>Si queremos instalar los .</a:t>
-            </a:r>
-            <a:r>
-              <a:rPr lang="es-ES" sz="2400" dirty="0" err="1"/>
-              <a:t>jar</a:t>
-            </a:r>
-            <a:r>
-              <a:rPr lang="es-ES" sz="2400" dirty="0"/>
-              <a:t>, usaremos el que tengamos tras instalar H2.</a:t>
-            </a:r>
-          </a:p>
-        </p:txBody>
-      </p:sp>
     </p:spTree>
     <p:extLst>
       <p:ext uri="{BB962C8B-B14F-4D97-AF65-F5344CB8AC3E}">
-        <p14:creationId xmlns:p14="http://schemas.microsoft.com/office/powerpoint/2010/main" val="2955535156"/>
+        <p14:creationId xmlns:p14="http://schemas.microsoft.com/office/powerpoint/2010/main" val="955749104"/>
       </p:ext>
     </p:extLst>
   </p:cSld>
@@ -3776,7 +3734,7 @@
         <p:spPr>
           <a:xfrm>
             <a:off x="457200" y="1868337"/>
-            <a:ext cx="5513308" cy="830997"/>
+            <a:ext cx="11375292" cy="461665"/>
           </a:xfrm>
           <a:prstGeom prst="rect">
             <a:avLst/>
@@ -3791,17 +3749,17 @@
           <a:p>
             <a:r>
               <a:rPr lang="es-ES" sz="2400" dirty="0"/>
-              <a:t>También usaremos un documento .java que sirve para configurar la conexión:</a:t>
+              <a:t>En el caso de un proyecto Maven, podremos estas dependencias en nuestro pom.xml:</a:t>
             </a:r>
           </a:p>
         </p:txBody>
       </p:sp>
       <p:pic>
         <p:nvPicPr>
-          <p:cNvPr id="7" name="Imagen 6">
-            <a:extLst>
-              <a:ext uri="{FF2B5EF4-FFF2-40B4-BE49-F238E27FC236}">
-                <a16:creationId xmlns:a16="http://schemas.microsoft.com/office/drawing/2014/main" id="{9C580DC2-33EE-4C4E-BB33-C11845E3F710}"/>
+          <p:cNvPr id="5" name="Imagen 4">
+            <a:extLst>
+              <a:ext uri="{FF2B5EF4-FFF2-40B4-BE49-F238E27FC236}">
+                <a16:creationId xmlns:a16="http://schemas.microsoft.com/office/drawing/2014/main" id="{F5901E75-625B-44A8-AF50-18FA18025ADC}"/>
               </a:ext>
             </a:extLst>
           </p:cNvPr>
@@ -3810,20 +3768,19 @@
           </p:cNvPicPr>
           <p:nvPr/>
         </p:nvPicPr>
-        <p:blipFill>
+        <p:blipFill rotWithShape="1">
           <a:blip r:embed="rId2"/>
-          <a:stretch>
-            <a:fillRect/>
-          </a:stretch>
+          <a:srcRect t="45535"/>
+          <a:stretch/>
         </p:blipFill>
         <p:spPr>
           <a:xfrm>
-            <a:off x="5970508" y="1602154"/>
-            <a:ext cx="5403586" cy="4680478"/>
+            <a:off x="3180346" y="2527377"/>
+            <a:ext cx="5159187" cy="1232723"/>
           </a:xfrm>
           <a:prstGeom prst="roundRect">
             <a:avLst>
-              <a:gd name="adj" fmla="val 2256"/>
+              <a:gd name="adj" fmla="val 3069"/>
             </a:avLst>
           </a:prstGeom>
           <a:solidFill>
@@ -3839,10 +3796,53 @@
           </a:effectLst>
         </p:spPr>
       </p:pic>
+      <p:sp>
+        <p:nvSpPr>
+          <p:cNvPr id="6" name="CuadroTexto 5">
+            <a:extLst>
+              <a:ext uri="{FF2B5EF4-FFF2-40B4-BE49-F238E27FC236}">
+                <a16:creationId xmlns:a16="http://schemas.microsoft.com/office/drawing/2014/main" id="{70D60588-0649-4326-A4ED-AD6682160212}"/>
+              </a:ext>
+            </a:extLst>
+          </p:cNvPr>
+          <p:cNvSpPr txBox="1"/>
+          <p:nvPr/>
+        </p:nvSpPr>
+        <p:spPr>
+          <a:xfrm>
+            <a:off x="336061" y="4297166"/>
+            <a:ext cx="11375292" cy="461665"/>
+          </a:xfrm>
+          <a:prstGeom prst="rect">
+            <a:avLst/>
+          </a:prstGeom>
+          <a:noFill/>
+        </p:spPr>
+        <p:txBody>
+          <a:bodyPr wrap="square" rtlCol="0">
+            <a:spAutoFit/>
+          </a:bodyPr>
+          <a:lstStyle/>
+          <a:p>
+            <a:r>
+              <a:rPr lang="es-ES" sz="2400" dirty="0"/>
+              <a:t>Si queremos instalar los .</a:t>
+            </a:r>
+            <a:r>
+              <a:rPr lang="es-ES" sz="2400" dirty="0" err="1"/>
+              <a:t>jar</a:t>
+            </a:r>
+            <a:r>
+              <a:rPr lang="es-ES" sz="2400" dirty="0"/>
+              <a:t>, usaremos el que tengamos tras instalar H2.</a:t>
+            </a:r>
+          </a:p>
+        </p:txBody>
+      </p:sp>
     </p:spTree>
     <p:extLst>
       <p:ext uri="{BB962C8B-B14F-4D97-AF65-F5344CB8AC3E}">
-        <p14:creationId xmlns:p14="http://schemas.microsoft.com/office/powerpoint/2010/main" val="2067053264"/>
+        <p14:creationId xmlns:p14="http://schemas.microsoft.com/office/powerpoint/2010/main" val="2955535156"/>
       </p:ext>
     </p:extLst>
   </p:cSld>
@@ -3874,7 +3874,7 @@
           <p:cNvPr id="2" name="Título 1">
             <a:extLst>
               <a:ext uri="{FF2B5EF4-FFF2-40B4-BE49-F238E27FC236}">
-                <a16:creationId xmlns:a16="http://schemas.microsoft.com/office/drawing/2014/main" id="{152712B1-5BFD-4504-A51F-5CBE8292E7CE}"/>
+                <a16:creationId xmlns:a16="http://schemas.microsoft.com/office/drawing/2014/main" id="{B274B7FE-33CF-4C0D-BF1D-075A06ECCCAB}"/>
               </a:ext>
             </a:extLst>
           </p:cNvPr>
@@ -3892,17 +3892,17 @@
           <a:p>
             <a:r>
               <a:rPr lang="es-ES" dirty="0"/>
-              <a:t>Consola h2</a:t>
-            </a:r>
-          </a:p>
-        </p:txBody>
-      </p:sp>
-      <p:sp>
-        <p:nvSpPr>
-          <p:cNvPr id="4" name="CuadroTexto 3">
-            <a:extLst>
-              <a:ext uri="{FF2B5EF4-FFF2-40B4-BE49-F238E27FC236}">
-                <a16:creationId xmlns:a16="http://schemas.microsoft.com/office/drawing/2014/main" id="{5A00C913-5A53-4DD7-9622-A80006EE214C}"/>
+              <a:t>Configurar H2 en un proyecto Maven</a:t>
+            </a:r>
+          </a:p>
+        </p:txBody>
+      </p:sp>
+      <p:sp>
+        <p:nvSpPr>
+          <p:cNvPr id="3" name="CuadroTexto 2">
+            <a:extLst>
+              <a:ext uri="{FF2B5EF4-FFF2-40B4-BE49-F238E27FC236}">
+                <a16:creationId xmlns:a16="http://schemas.microsoft.com/office/drawing/2014/main" id="{B17DD1BF-A926-4DE4-84D1-9F4839277484}"/>
               </a:ext>
             </a:extLst>
           </p:cNvPr>
@@ -3911,8 +3911,8 @@
         </p:nvSpPr>
         <p:spPr>
           <a:xfrm>
-            <a:off x="181924" y="1914509"/>
-            <a:ext cx="3277713" cy="1200329"/>
+            <a:off x="457200" y="1868337"/>
+            <a:ext cx="5513308" cy="830997"/>
           </a:xfrm>
           <a:prstGeom prst="rect">
             <a:avLst/>
@@ -3927,17 +3927,17 @@
           <a:p>
             <a:r>
               <a:rPr lang="es-ES" sz="2400" dirty="0"/>
-              <a:t>Al entrar a la consola, se mostrará la siguiente ventana:</a:t>
+              <a:t>También usaremos un documento .java que sirve para configurar la conexión:</a:t>
             </a:r>
           </a:p>
         </p:txBody>
       </p:sp>
       <p:pic>
         <p:nvPicPr>
-          <p:cNvPr id="5" name="Imagen 4">
-            <a:extLst>
-              <a:ext uri="{FF2B5EF4-FFF2-40B4-BE49-F238E27FC236}">
-                <a16:creationId xmlns:a16="http://schemas.microsoft.com/office/drawing/2014/main" id="{3FC1F0FE-8C97-44E8-B7F2-12653B307836}"/>
+          <p:cNvPr id="7" name="Imagen 6">
+            <a:extLst>
+              <a:ext uri="{FF2B5EF4-FFF2-40B4-BE49-F238E27FC236}">
+                <a16:creationId xmlns:a16="http://schemas.microsoft.com/office/drawing/2014/main" id="{9C580DC2-33EE-4C4E-BB33-C11845E3F710}"/>
               </a:ext>
             </a:extLst>
           </p:cNvPr>
@@ -3954,12 +3954,12 @@
         </p:blipFill>
         <p:spPr>
           <a:xfrm>
-            <a:off x="6010708" y="1510470"/>
-            <a:ext cx="4976291" cy="4930567"/>
+            <a:off x="5970508" y="1602154"/>
+            <a:ext cx="5403586" cy="4680478"/>
           </a:xfrm>
           <a:prstGeom prst="roundRect">
             <a:avLst>
-              <a:gd name="adj" fmla="val 2667"/>
+              <a:gd name="adj" fmla="val 2256"/>
             </a:avLst>
           </a:prstGeom>
           <a:solidFill>
@@ -3975,438 +3975,10 @@
           </a:effectLst>
         </p:spPr>
       </p:pic>
-      <p:sp>
-        <p:nvSpPr>
-          <p:cNvPr id="8" name="Elipse 7">
-            <a:extLst>
-              <a:ext uri="{FF2B5EF4-FFF2-40B4-BE49-F238E27FC236}">
-                <a16:creationId xmlns:a16="http://schemas.microsoft.com/office/drawing/2014/main" id="{71C06BC0-EC7B-4989-9FE2-155E641DD6A4}"/>
-              </a:ext>
-            </a:extLst>
-          </p:cNvPr>
-          <p:cNvSpPr/>
-          <p:nvPr/>
-        </p:nvSpPr>
-        <p:spPr>
-          <a:xfrm>
-            <a:off x="5742043" y="1352575"/>
-            <a:ext cx="292231" cy="301093"/>
-          </a:xfrm>
-          <a:prstGeom prst="ellipse">
-            <a:avLst/>
-          </a:prstGeom>
-          <a:solidFill>
-            <a:schemeClr val="bg2">
-              <a:lumMod val="60000"/>
-              <a:lumOff val="40000"/>
-            </a:schemeClr>
-          </a:solidFill>
-        </p:spPr>
-        <p:style>
-          <a:lnRef idx="2">
-            <a:schemeClr val="accent1">
-              <a:shade val="50000"/>
-            </a:schemeClr>
-          </a:lnRef>
-          <a:fillRef idx="1">
-            <a:schemeClr val="accent1"/>
-          </a:fillRef>
-          <a:effectRef idx="0">
-            <a:schemeClr val="accent1"/>
-          </a:effectRef>
-          <a:fontRef idx="minor">
-            <a:schemeClr val="lt1"/>
-          </a:fontRef>
-        </p:style>
-        <p:txBody>
-          <a:bodyPr rtlCol="0" anchor="ctr"/>
-          <a:lstStyle/>
-          <a:p>
-            <a:pPr algn="ctr"/>
-            <a:endParaRPr lang="es-ES"/>
-          </a:p>
-        </p:txBody>
-      </p:sp>
-      <p:sp>
-        <p:nvSpPr>
-          <p:cNvPr id="7" name="CuadroTexto 6">
-            <a:extLst>
-              <a:ext uri="{FF2B5EF4-FFF2-40B4-BE49-F238E27FC236}">
-                <a16:creationId xmlns:a16="http://schemas.microsoft.com/office/drawing/2014/main" id="{189DF3A3-C936-4D9C-ADFB-D353DC64025D}"/>
-              </a:ext>
-            </a:extLst>
-          </p:cNvPr>
-          <p:cNvSpPr txBox="1"/>
-          <p:nvPr/>
-        </p:nvSpPr>
-        <p:spPr>
-          <a:xfrm>
-            <a:off x="5742044" y="1253558"/>
-            <a:ext cx="268664" cy="400110"/>
-          </a:xfrm>
-          <a:prstGeom prst="rect">
-            <a:avLst/>
-          </a:prstGeom>
-          <a:noFill/>
-        </p:spPr>
-        <p:txBody>
-          <a:bodyPr wrap="square" rtlCol="0">
-            <a:spAutoFit/>
-          </a:bodyPr>
-          <a:lstStyle/>
-          <a:p>
-            <a:r>
-              <a:rPr lang="es-ES" sz="2000" dirty="0"/>
-              <a:t>1</a:t>
-            </a:r>
-            <a:endParaRPr lang="es-ES" dirty="0"/>
-          </a:p>
-        </p:txBody>
-      </p:sp>
-      <p:sp>
-        <p:nvSpPr>
-          <p:cNvPr id="10" name="Elipse 9">
-            <a:extLst>
-              <a:ext uri="{FF2B5EF4-FFF2-40B4-BE49-F238E27FC236}">
-                <a16:creationId xmlns:a16="http://schemas.microsoft.com/office/drawing/2014/main" id="{4597AC2E-528B-4E80-9A98-1E23394ADDE3}"/>
-              </a:ext>
-            </a:extLst>
-          </p:cNvPr>
-          <p:cNvSpPr/>
-          <p:nvPr/>
-        </p:nvSpPr>
-        <p:spPr>
-          <a:xfrm>
-            <a:off x="5742043" y="2013526"/>
-            <a:ext cx="292231" cy="301093"/>
-          </a:xfrm>
-          <a:prstGeom prst="ellipse">
-            <a:avLst/>
-          </a:prstGeom>
-          <a:solidFill>
-            <a:schemeClr val="bg2">
-              <a:lumMod val="60000"/>
-              <a:lumOff val="40000"/>
-            </a:schemeClr>
-          </a:solidFill>
-        </p:spPr>
-        <p:style>
-          <a:lnRef idx="2">
-            <a:schemeClr val="accent1">
-              <a:shade val="50000"/>
-            </a:schemeClr>
-          </a:lnRef>
-          <a:fillRef idx="1">
-            <a:schemeClr val="accent1"/>
-          </a:fillRef>
-          <a:effectRef idx="0">
-            <a:schemeClr val="accent1"/>
-          </a:effectRef>
-          <a:fontRef idx="minor">
-            <a:schemeClr val="lt1"/>
-          </a:fontRef>
-        </p:style>
-        <p:txBody>
-          <a:bodyPr rtlCol="0" anchor="ctr"/>
-          <a:lstStyle/>
-          <a:p>
-            <a:pPr algn="ctr"/>
-            <a:endParaRPr lang="es-ES"/>
-          </a:p>
-        </p:txBody>
-      </p:sp>
-      <p:sp>
-        <p:nvSpPr>
-          <p:cNvPr id="11" name="CuadroTexto 10">
-            <a:extLst>
-              <a:ext uri="{FF2B5EF4-FFF2-40B4-BE49-F238E27FC236}">
-                <a16:creationId xmlns:a16="http://schemas.microsoft.com/office/drawing/2014/main" id="{452C7D0F-5536-4C7C-BF42-84829893AF8A}"/>
-              </a:ext>
-            </a:extLst>
-          </p:cNvPr>
-          <p:cNvSpPr txBox="1"/>
-          <p:nvPr/>
-        </p:nvSpPr>
-        <p:spPr>
-          <a:xfrm>
-            <a:off x="5742044" y="1914509"/>
-            <a:ext cx="268664" cy="400110"/>
-          </a:xfrm>
-          <a:prstGeom prst="rect">
-            <a:avLst/>
-          </a:prstGeom>
-          <a:noFill/>
-        </p:spPr>
-        <p:txBody>
-          <a:bodyPr wrap="square" rtlCol="0">
-            <a:spAutoFit/>
-          </a:bodyPr>
-          <a:lstStyle/>
-          <a:p>
-            <a:r>
-              <a:rPr lang="es-ES" sz="2000" dirty="0"/>
-              <a:t>2</a:t>
-            </a:r>
-            <a:endParaRPr lang="es-ES" dirty="0"/>
-          </a:p>
-        </p:txBody>
-      </p:sp>
-      <p:sp>
-        <p:nvSpPr>
-          <p:cNvPr id="12" name="Elipse 11">
-            <a:extLst>
-              <a:ext uri="{FF2B5EF4-FFF2-40B4-BE49-F238E27FC236}">
-                <a16:creationId xmlns:a16="http://schemas.microsoft.com/office/drawing/2014/main" id="{0D8E0DB0-F831-4622-930C-44A5FE128235}"/>
-              </a:ext>
-            </a:extLst>
-          </p:cNvPr>
-          <p:cNvSpPr/>
-          <p:nvPr/>
-        </p:nvSpPr>
-        <p:spPr>
-          <a:xfrm>
-            <a:off x="7399930" y="1710040"/>
-            <a:ext cx="292231" cy="301093"/>
-          </a:xfrm>
-          <a:prstGeom prst="ellipse">
-            <a:avLst/>
-          </a:prstGeom>
-          <a:solidFill>
-            <a:schemeClr val="bg2">
-              <a:lumMod val="60000"/>
-              <a:lumOff val="40000"/>
-            </a:schemeClr>
-          </a:solidFill>
-        </p:spPr>
-        <p:style>
-          <a:lnRef idx="2">
-            <a:schemeClr val="accent1">
-              <a:shade val="50000"/>
-            </a:schemeClr>
-          </a:lnRef>
-          <a:fillRef idx="1">
-            <a:schemeClr val="accent1"/>
-          </a:fillRef>
-          <a:effectRef idx="0">
-            <a:schemeClr val="accent1"/>
-          </a:effectRef>
-          <a:fontRef idx="minor">
-            <a:schemeClr val="lt1"/>
-          </a:fontRef>
-        </p:style>
-        <p:txBody>
-          <a:bodyPr rtlCol="0" anchor="ctr"/>
-          <a:lstStyle/>
-          <a:p>
-            <a:pPr algn="ctr"/>
-            <a:endParaRPr lang="es-ES"/>
-          </a:p>
-        </p:txBody>
-      </p:sp>
-      <p:sp>
-        <p:nvSpPr>
-          <p:cNvPr id="13" name="CuadroTexto 12">
-            <a:extLst>
-              <a:ext uri="{FF2B5EF4-FFF2-40B4-BE49-F238E27FC236}">
-                <a16:creationId xmlns:a16="http://schemas.microsoft.com/office/drawing/2014/main" id="{B8B8FCAD-09D2-4F10-BCBC-15DD3569CB4A}"/>
-              </a:ext>
-            </a:extLst>
-          </p:cNvPr>
-          <p:cNvSpPr txBox="1"/>
-          <p:nvPr/>
-        </p:nvSpPr>
-        <p:spPr>
-          <a:xfrm>
-            <a:off x="7403466" y="1592881"/>
-            <a:ext cx="268664" cy="400110"/>
-          </a:xfrm>
-          <a:prstGeom prst="rect">
-            <a:avLst/>
-          </a:prstGeom>
-          <a:noFill/>
-        </p:spPr>
-        <p:txBody>
-          <a:bodyPr wrap="square" rtlCol="0">
-            <a:spAutoFit/>
-          </a:bodyPr>
-          <a:lstStyle/>
-          <a:p>
-            <a:r>
-              <a:rPr lang="es-ES" sz="2000" dirty="0"/>
-              <a:t>3</a:t>
-            </a:r>
-            <a:endParaRPr lang="es-ES" dirty="0"/>
-          </a:p>
-        </p:txBody>
-      </p:sp>
-      <p:sp>
-        <p:nvSpPr>
-          <p:cNvPr id="14" name="Elipse 13">
-            <a:extLst>
-              <a:ext uri="{FF2B5EF4-FFF2-40B4-BE49-F238E27FC236}">
-                <a16:creationId xmlns:a16="http://schemas.microsoft.com/office/drawing/2014/main" id="{71EAEACD-7651-43CA-BDA9-46F7F7577729}"/>
-              </a:ext>
-            </a:extLst>
-          </p:cNvPr>
-          <p:cNvSpPr/>
-          <p:nvPr/>
-        </p:nvSpPr>
-        <p:spPr>
-          <a:xfrm>
-            <a:off x="7269133" y="3154942"/>
-            <a:ext cx="292231" cy="301093"/>
-          </a:xfrm>
-          <a:prstGeom prst="ellipse">
-            <a:avLst/>
-          </a:prstGeom>
-          <a:solidFill>
-            <a:schemeClr val="bg2">
-              <a:lumMod val="60000"/>
-              <a:lumOff val="40000"/>
-            </a:schemeClr>
-          </a:solidFill>
-        </p:spPr>
-        <p:style>
-          <a:lnRef idx="2">
-            <a:schemeClr val="accent1">
-              <a:shade val="50000"/>
-            </a:schemeClr>
-          </a:lnRef>
-          <a:fillRef idx="1">
-            <a:schemeClr val="accent1"/>
-          </a:fillRef>
-          <a:effectRef idx="0">
-            <a:schemeClr val="accent1"/>
-          </a:effectRef>
-          <a:fontRef idx="minor">
-            <a:schemeClr val="lt1"/>
-          </a:fontRef>
-        </p:style>
-        <p:txBody>
-          <a:bodyPr rtlCol="0" anchor="ctr"/>
-          <a:lstStyle/>
-          <a:p>
-            <a:pPr algn="ctr"/>
-            <a:endParaRPr lang="es-ES"/>
-          </a:p>
-        </p:txBody>
-      </p:sp>
-      <p:sp>
-        <p:nvSpPr>
-          <p:cNvPr id="15" name="CuadroTexto 14">
-            <a:extLst>
-              <a:ext uri="{FF2B5EF4-FFF2-40B4-BE49-F238E27FC236}">
-                <a16:creationId xmlns:a16="http://schemas.microsoft.com/office/drawing/2014/main" id="{50385A4E-84CC-4903-A086-B28FA7ADE70C}"/>
-              </a:ext>
-            </a:extLst>
-          </p:cNvPr>
-          <p:cNvSpPr txBox="1"/>
-          <p:nvPr/>
-        </p:nvSpPr>
-        <p:spPr>
-          <a:xfrm>
-            <a:off x="7269134" y="3055925"/>
-            <a:ext cx="268664" cy="400110"/>
-          </a:xfrm>
-          <a:prstGeom prst="rect">
-            <a:avLst/>
-          </a:prstGeom>
-          <a:noFill/>
-        </p:spPr>
-        <p:txBody>
-          <a:bodyPr wrap="square" rtlCol="0">
-            <a:spAutoFit/>
-          </a:bodyPr>
-          <a:lstStyle/>
-          <a:p>
-            <a:r>
-              <a:rPr lang="es-ES" sz="2000" dirty="0"/>
-              <a:t>4</a:t>
-            </a:r>
-            <a:endParaRPr lang="es-ES" dirty="0"/>
-          </a:p>
-        </p:txBody>
-      </p:sp>
-      <p:sp>
-        <p:nvSpPr>
-          <p:cNvPr id="16" name="CuadroTexto 15">
-            <a:extLst>
-              <a:ext uri="{FF2B5EF4-FFF2-40B4-BE49-F238E27FC236}">
-                <a16:creationId xmlns:a16="http://schemas.microsoft.com/office/drawing/2014/main" id="{3C8635D5-9F40-4A32-AE84-CAC4BCEDA939}"/>
-              </a:ext>
-            </a:extLst>
-          </p:cNvPr>
-          <p:cNvSpPr txBox="1"/>
-          <p:nvPr/>
-        </p:nvSpPr>
-        <p:spPr>
-          <a:xfrm>
-            <a:off x="289169" y="3313723"/>
-            <a:ext cx="4845539" cy="1754326"/>
-          </a:xfrm>
-          <a:prstGeom prst="rect">
-            <a:avLst/>
-          </a:prstGeom>
-          <a:noFill/>
-        </p:spPr>
-        <p:txBody>
-          <a:bodyPr wrap="square" rtlCol="0">
-            <a:spAutoFit/>
-          </a:bodyPr>
-          <a:lstStyle/>
-          <a:p>
-            <a:pPr marL="342900" indent="-342900">
-              <a:buFont typeface="+mj-lt"/>
-              <a:buAutoNum type="arabicPeriod"/>
-            </a:pPr>
-            <a:r>
-              <a:rPr lang="es-ES" dirty="0"/>
-              <a:t>Barra de tareas</a:t>
-            </a:r>
-          </a:p>
-          <a:p>
-            <a:pPr marL="342900" indent="-342900">
-              <a:buFont typeface="+mj-lt"/>
-              <a:buAutoNum type="arabicPeriod"/>
-            </a:pPr>
-            <a:r>
-              <a:rPr lang="es-ES" dirty="0"/>
-              <a:t>Explorador de archivos/tablas</a:t>
-            </a:r>
-          </a:p>
-          <a:p>
-            <a:pPr marL="342900" indent="-342900">
-              <a:buFont typeface="+mj-lt"/>
-              <a:buAutoNum type="arabicPeriod"/>
-            </a:pPr>
-            <a:r>
-              <a:rPr lang="es-ES" dirty="0"/>
-              <a:t>Cuadro de texto (Aquí se colocan los comandos SQL)</a:t>
-            </a:r>
-          </a:p>
-          <a:p>
-            <a:pPr marL="342900" indent="-342900">
-              <a:buFont typeface="+mj-lt"/>
-              <a:buAutoNum type="arabicPeriod"/>
-            </a:pPr>
-            <a:r>
-              <a:rPr lang="es-ES" dirty="0"/>
-              <a:t>Zona View donde se muestran los resultados.</a:t>
-            </a:r>
-          </a:p>
-          <a:p>
-            <a:pPr marL="342900" indent="-342900">
-              <a:buFont typeface="+mj-lt"/>
-              <a:buAutoNum type="arabicPeriod"/>
-            </a:pPr>
-            <a:endParaRPr lang="es-ES" dirty="0"/>
-          </a:p>
-        </p:txBody>
-      </p:sp>
     </p:spTree>
     <p:extLst>
       <p:ext uri="{BB962C8B-B14F-4D97-AF65-F5344CB8AC3E}">
-        <p14:creationId xmlns:p14="http://schemas.microsoft.com/office/powerpoint/2010/main" val="1611437025"/>
+        <p14:creationId xmlns:p14="http://schemas.microsoft.com/office/powerpoint/2010/main" val="2067053264"/>
       </p:ext>
     </p:extLst>
   </p:cSld>
@@ -4476,7 +4048,7 @@
         <p:spPr>
           <a:xfrm>
             <a:off x="181924" y="1914509"/>
-            <a:ext cx="6281399" cy="2308324"/>
+            <a:ext cx="3277713" cy="1200329"/>
           </a:xfrm>
           <a:prstGeom prst="rect">
             <a:avLst/>
@@ -4491,26 +4063,17 @@
           <a:p>
             <a:r>
               <a:rPr lang="es-ES" sz="2400" dirty="0"/>
-              <a:t>Al pulsar sobre una tabla que hayamos creado, nuestro cuadro de texto pondrá esta sentencia SQL.</a:t>
-            </a:r>
-          </a:p>
-          <a:p>
-            <a:endParaRPr lang="es-ES" sz="2400" dirty="0"/>
-          </a:p>
-          <a:p>
-            <a:r>
-              <a:rPr lang="es-ES" sz="2400" dirty="0"/>
-              <a:t>Al presionar el botón de ‘Ejecutar’ nos mostrará el contenido de la tabla.</a:t>
+              <a:t>Al entrar a la consola, se mostrará la siguiente ventana:</a:t>
             </a:r>
           </a:p>
         </p:txBody>
       </p:sp>
       <p:pic>
         <p:nvPicPr>
-          <p:cNvPr id="6" name="Imagen 5">
-            <a:extLst>
-              <a:ext uri="{FF2B5EF4-FFF2-40B4-BE49-F238E27FC236}">
-                <a16:creationId xmlns:a16="http://schemas.microsoft.com/office/drawing/2014/main" id="{60A8FBCF-7E45-485E-90BE-7FB60E7AC6CA}"/>
+          <p:cNvPr id="5" name="Imagen 4">
+            <a:extLst>
+              <a:ext uri="{FF2B5EF4-FFF2-40B4-BE49-F238E27FC236}">
+                <a16:creationId xmlns:a16="http://schemas.microsoft.com/office/drawing/2014/main" id="{3FC1F0FE-8C97-44E8-B7F2-12653B307836}"/>
               </a:ext>
             </a:extLst>
           </p:cNvPr>
@@ -4527,12 +4090,12 @@
         </p:blipFill>
         <p:spPr>
           <a:xfrm>
-            <a:off x="6571857" y="2018210"/>
-            <a:ext cx="5462799" cy="3132128"/>
+            <a:off x="6010708" y="1510470"/>
+            <a:ext cx="4976291" cy="4930567"/>
           </a:xfrm>
           <a:prstGeom prst="roundRect">
             <a:avLst>
-              <a:gd name="adj" fmla="val 5879"/>
+              <a:gd name="adj" fmla="val 2667"/>
             </a:avLst>
           </a:prstGeom>
           <a:solidFill>
@@ -4548,10 +4111,438 @@
           </a:effectLst>
         </p:spPr>
       </p:pic>
+      <p:sp>
+        <p:nvSpPr>
+          <p:cNvPr id="8" name="Elipse 7">
+            <a:extLst>
+              <a:ext uri="{FF2B5EF4-FFF2-40B4-BE49-F238E27FC236}">
+                <a16:creationId xmlns:a16="http://schemas.microsoft.com/office/drawing/2014/main" id="{71C06BC0-EC7B-4989-9FE2-155E641DD6A4}"/>
+              </a:ext>
+            </a:extLst>
+          </p:cNvPr>
+          <p:cNvSpPr/>
+          <p:nvPr/>
+        </p:nvSpPr>
+        <p:spPr>
+          <a:xfrm>
+            <a:off x="5742043" y="1352575"/>
+            <a:ext cx="292231" cy="301093"/>
+          </a:xfrm>
+          <a:prstGeom prst="ellipse">
+            <a:avLst/>
+          </a:prstGeom>
+          <a:solidFill>
+            <a:schemeClr val="bg2">
+              <a:lumMod val="60000"/>
+              <a:lumOff val="40000"/>
+            </a:schemeClr>
+          </a:solidFill>
+        </p:spPr>
+        <p:style>
+          <a:lnRef idx="2">
+            <a:schemeClr val="accent1">
+              <a:shade val="50000"/>
+            </a:schemeClr>
+          </a:lnRef>
+          <a:fillRef idx="1">
+            <a:schemeClr val="accent1"/>
+          </a:fillRef>
+          <a:effectRef idx="0">
+            <a:schemeClr val="accent1"/>
+          </a:effectRef>
+          <a:fontRef idx="minor">
+            <a:schemeClr val="lt1"/>
+          </a:fontRef>
+        </p:style>
+        <p:txBody>
+          <a:bodyPr rtlCol="0" anchor="ctr"/>
+          <a:lstStyle/>
+          <a:p>
+            <a:pPr algn="ctr"/>
+            <a:endParaRPr lang="es-ES"/>
+          </a:p>
+        </p:txBody>
+      </p:sp>
+      <p:sp>
+        <p:nvSpPr>
+          <p:cNvPr id="7" name="CuadroTexto 6">
+            <a:extLst>
+              <a:ext uri="{FF2B5EF4-FFF2-40B4-BE49-F238E27FC236}">
+                <a16:creationId xmlns:a16="http://schemas.microsoft.com/office/drawing/2014/main" id="{189DF3A3-C936-4D9C-ADFB-D353DC64025D}"/>
+              </a:ext>
+            </a:extLst>
+          </p:cNvPr>
+          <p:cNvSpPr txBox="1"/>
+          <p:nvPr/>
+        </p:nvSpPr>
+        <p:spPr>
+          <a:xfrm>
+            <a:off x="5742044" y="1253558"/>
+            <a:ext cx="268664" cy="400110"/>
+          </a:xfrm>
+          <a:prstGeom prst="rect">
+            <a:avLst/>
+          </a:prstGeom>
+          <a:noFill/>
+        </p:spPr>
+        <p:txBody>
+          <a:bodyPr wrap="square" rtlCol="0">
+            <a:spAutoFit/>
+          </a:bodyPr>
+          <a:lstStyle/>
+          <a:p>
+            <a:r>
+              <a:rPr lang="es-ES" sz="2000" dirty="0"/>
+              <a:t>1</a:t>
+            </a:r>
+            <a:endParaRPr lang="es-ES" dirty="0"/>
+          </a:p>
+        </p:txBody>
+      </p:sp>
+      <p:sp>
+        <p:nvSpPr>
+          <p:cNvPr id="10" name="Elipse 9">
+            <a:extLst>
+              <a:ext uri="{FF2B5EF4-FFF2-40B4-BE49-F238E27FC236}">
+                <a16:creationId xmlns:a16="http://schemas.microsoft.com/office/drawing/2014/main" id="{4597AC2E-528B-4E80-9A98-1E23394ADDE3}"/>
+              </a:ext>
+            </a:extLst>
+          </p:cNvPr>
+          <p:cNvSpPr/>
+          <p:nvPr/>
+        </p:nvSpPr>
+        <p:spPr>
+          <a:xfrm>
+            <a:off x="5742043" y="2013526"/>
+            <a:ext cx="292231" cy="301093"/>
+          </a:xfrm>
+          <a:prstGeom prst="ellipse">
+            <a:avLst/>
+          </a:prstGeom>
+          <a:solidFill>
+            <a:schemeClr val="bg2">
+              <a:lumMod val="60000"/>
+              <a:lumOff val="40000"/>
+            </a:schemeClr>
+          </a:solidFill>
+        </p:spPr>
+        <p:style>
+          <a:lnRef idx="2">
+            <a:schemeClr val="accent1">
+              <a:shade val="50000"/>
+            </a:schemeClr>
+          </a:lnRef>
+          <a:fillRef idx="1">
+            <a:schemeClr val="accent1"/>
+          </a:fillRef>
+          <a:effectRef idx="0">
+            <a:schemeClr val="accent1"/>
+          </a:effectRef>
+          <a:fontRef idx="minor">
+            <a:schemeClr val="lt1"/>
+          </a:fontRef>
+        </p:style>
+        <p:txBody>
+          <a:bodyPr rtlCol="0" anchor="ctr"/>
+          <a:lstStyle/>
+          <a:p>
+            <a:pPr algn="ctr"/>
+            <a:endParaRPr lang="es-ES"/>
+          </a:p>
+        </p:txBody>
+      </p:sp>
+      <p:sp>
+        <p:nvSpPr>
+          <p:cNvPr id="11" name="CuadroTexto 10">
+            <a:extLst>
+              <a:ext uri="{FF2B5EF4-FFF2-40B4-BE49-F238E27FC236}">
+                <a16:creationId xmlns:a16="http://schemas.microsoft.com/office/drawing/2014/main" id="{452C7D0F-5536-4C7C-BF42-84829893AF8A}"/>
+              </a:ext>
+            </a:extLst>
+          </p:cNvPr>
+          <p:cNvSpPr txBox="1"/>
+          <p:nvPr/>
+        </p:nvSpPr>
+        <p:spPr>
+          <a:xfrm>
+            <a:off x="5742044" y="1914509"/>
+            <a:ext cx="268664" cy="400110"/>
+          </a:xfrm>
+          <a:prstGeom prst="rect">
+            <a:avLst/>
+          </a:prstGeom>
+          <a:noFill/>
+        </p:spPr>
+        <p:txBody>
+          <a:bodyPr wrap="square" rtlCol="0">
+            <a:spAutoFit/>
+          </a:bodyPr>
+          <a:lstStyle/>
+          <a:p>
+            <a:r>
+              <a:rPr lang="es-ES" sz="2000" dirty="0"/>
+              <a:t>2</a:t>
+            </a:r>
+            <a:endParaRPr lang="es-ES" dirty="0"/>
+          </a:p>
+        </p:txBody>
+      </p:sp>
+      <p:sp>
+        <p:nvSpPr>
+          <p:cNvPr id="12" name="Elipse 11">
+            <a:extLst>
+              <a:ext uri="{FF2B5EF4-FFF2-40B4-BE49-F238E27FC236}">
+                <a16:creationId xmlns:a16="http://schemas.microsoft.com/office/drawing/2014/main" id="{0D8E0DB0-F831-4622-930C-44A5FE128235}"/>
+              </a:ext>
+            </a:extLst>
+          </p:cNvPr>
+          <p:cNvSpPr/>
+          <p:nvPr/>
+        </p:nvSpPr>
+        <p:spPr>
+          <a:xfrm>
+            <a:off x="7399930" y="1710040"/>
+            <a:ext cx="292231" cy="301093"/>
+          </a:xfrm>
+          <a:prstGeom prst="ellipse">
+            <a:avLst/>
+          </a:prstGeom>
+          <a:solidFill>
+            <a:schemeClr val="bg2">
+              <a:lumMod val="60000"/>
+              <a:lumOff val="40000"/>
+            </a:schemeClr>
+          </a:solidFill>
+        </p:spPr>
+        <p:style>
+          <a:lnRef idx="2">
+            <a:schemeClr val="accent1">
+              <a:shade val="50000"/>
+            </a:schemeClr>
+          </a:lnRef>
+          <a:fillRef idx="1">
+            <a:schemeClr val="accent1"/>
+          </a:fillRef>
+          <a:effectRef idx="0">
+            <a:schemeClr val="accent1"/>
+          </a:effectRef>
+          <a:fontRef idx="minor">
+            <a:schemeClr val="lt1"/>
+          </a:fontRef>
+        </p:style>
+        <p:txBody>
+          <a:bodyPr rtlCol="0" anchor="ctr"/>
+          <a:lstStyle/>
+          <a:p>
+            <a:pPr algn="ctr"/>
+            <a:endParaRPr lang="es-ES"/>
+          </a:p>
+        </p:txBody>
+      </p:sp>
+      <p:sp>
+        <p:nvSpPr>
+          <p:cNvPr id="13" name="CuadroTexto 12">
+            <a:extLst>
+              <a:ext uri="{FF2B5EF4-FFF2-40B4-BE49-F238E27FC236}">
+                <a16:creationId xmlns:a16="http://schemas.microsoft.com/office/drawing/2014/main" id="{B8B8FCAD-09D2-4F10-BCBC-15DD3569CB4A}"/>
+              </a:ext>
+            </a:extLst>
+          </p:cNvPr>
+          <p:cNvSpPr txBox="1"/>
+          <p:nvPr/>
+        </p:nvSpPr>
+        <p:spPr>
+          <a:xfrm>
+            <a:off x="7403466" y="1592881"/>
+            <a:ext cx="268664" cy="400110"/>
+          </a:xfrm>
+          <a:prstGeom prst="rect">
+            <a:avLst/>
+          </a:prstGeom>
+          <a:noFill/>
+        </p:spPr>
+        <p:txBody>
+          <a:bodyPr wrap="square" rtlCol="0">
+            <a:spAutoFit/>
+          </a:bodyPr>
+          <a:lstStyle/>
+          <a:p>
+            <a:r>
+              <a:rPr lang="es-ES" sz="2000" dirty="0"/>
+              <a:t>3</a:t>
+            </a:r>
+            <a:endParaRPr lang="es-ES" dirty="0"/>
+          </a:p>
+        </p:txBody>
+      </p:sp>
+      <p:sp>
+        <p:nvSpPr>
+          <p:cNvPr id="14" name="Elipse 13">
+            <a:extLst>
+              <a:ext uri="{FF2B5EF4-FFF2-40B4-BE49-F238E27FC236}">
+                <a16:creationId xmlns:a16="http://schemas.microsoft.com/office/drawing/2014/main" id="{71EAEACD-7651-43CA-BDA9-46F7F7577729}"/>
+              </a:ext>
+            </a:extLst>
+          </p:cNvPr>
+          <p:cNvSpPr/>
+          <p:nvPr/>
+        </p:nvSpPr>
+        <p:spPr>
+          <a:xfrm>
+            <a:off x="7269133" y="3154942"/>
+            <a:ext cx="292231" cy="301093"/>
+          </a:xfrm>
+          <a:prstGeom prst="ellipse">
+            <a:avLst/>
+          </a:prstGeom>
+          <a:solidFill>
+            <a:schemeClr val="bg2">
+              <a:lumMod val="60000"/>
+              <a:lumOff val="40000"/>
+            </a:schemeClr>
+          </a:solidFill>
+        </p:spPr>
+        <p:style>
+          <a:lnRef idx="2">
+            <a:schemeClr val="accent1">
+              <a:shade val="50000"/>
+            </a:schemeClr>
+          </a:lnRef>
+          <a:fillRef idx="1">
+            <a:schemeClr val="accent1"/>
+          </a:fillRef>
+          <a:effectRef idx="0">
+            <a:schemeClr val="accent1"/>
+          </a:effectRef>
+          <a:fontRef idx="minor">
+            <a:schemeClr val="lt1"/>
+          </a:fontRef>
+        </p:style>
+        <p:txBody>
+          <a:bodyPr rtlCol="0" anchor="ctr"/>
+          <a:lstStyle/>
+          <a:p>
+            <a:pPr algn="ctr"/>
+            <a:endParaRPr lang="es-ES"/>
+          </a:p>
+        </p:txBody>
+      </p:sp>
+      <p:sp>
+        <p:nvSpPr>
+          <p:cNvPr id="15" name="CuadroTexto 14">
+            <a:extLst>
+              <a:ext uri="{FF2B5EF4-FFF2-40B4-BE49-F238E27FC236}">
+                <a16:creationId xmlns:a16="http://schemas.microsoft.com/office/drawing/2014/main" id="{50385A4E-84CC-4903-A086-B28FA7ADE70C}"/>
+              </a:ext>
+            </a:extLst>
+          </p:cNvPr>
+          <p:cNvSpPr txBox="1"/>
+          <p:nvPr/>
+        </p:nvSpPr>
+        <p:spPr>
+          <a:xfrm>
+            <a:off x="7269134" y="3055925"/>
+            <a:ext cx="268664" cy="400110"/>
+          </a:xfrm>
+          <a:prstGeom prst="rect">
+            <a:avLst/>
+          </a:prstGeom>
+          <a:noFill/>
+        </p:spPr>
+        <p:txBody>
+          <a:bodyPr wrap="square" rtlCol="0">
+            <a:spAutoFit/>
+          </a:bodyPr>
+          <a:lstStyle/>
+          <a:p>
+            <a:r>
+              <a:rPr lang="es-ES" sz="2000" dirty="0"/>
+              <a:t>4</a:t>
+            </a:r>
+            <a:endParaRPr lang="es-ES" dirty="0"/>
+          </a:p>
+        </p:txBody>
+      </p:sp>
+      <p:sp>
+        <p:nvSpPr>
+          <p:cNvPr id="16" name="CuadroTexto 15">
+            <a:extLst>
+              <a:ext uri="{FF2B5EF4-FFF2-40B4-BE49-F238E27FC236}">
+                <a16:creationId xmlns:a16="http://schemas.microsoft.com/office/drawing/2014/main" id="{3C8635D5-9F40-4A32-AE84-CAC4BCEDA939}"/>
+              </a:ext>
+            </a:extLst>
+          </p:cNvPr>
+          <p:cNvSpPr txBox="1"/>
+          <p:nvPr/>
+        </p:nvSpPr>
+        <p:spPr>
+          <a:xfrm>
+            <a:off x="289169" y="3313723"/>
+            <a:ext cx="4845539" cy="1754326"/>
+          </a:xfrm>
+          <a:prstGeom prst="rect">
+            <a:avLst/>
+          </a:prstGeom>
+          <a:noFill/>
+        </p:spPr>
+        <p:txBody>
+          <a:bodyPr wrap="square" rtlCol="0">
+            <a:spAutoFit/>
+          </a:bodyPr>
+          <a:lstStyle/>
+          <a:p>
+            <a:pPr marL="342900" indent="-342900">
+              <a:buFont typeface="+mj-lt"/>
+              <a:buAutoNum type="arabicPeriod"/>
+            </a:pPr>
+            <a:r>
+              <a:rPr lang="es-ES" dirty="0"/>
+              <a:t>Barra de tareas</a:t>
+            </a:r>
+          </a:p>
+          <a:p>
+            <a:pPr marL="342900" indent="-342900">
+              <a:buFont typeface="+mj-lt"/>
+              <a:buAutoNum type="arabicPeriod"/>
+            </a:pPr>
+            <a:r>
+              <a:rPr lang="es-ES" dirty="0"/>
+              <a:t>Explorador de archivos/tablas</a:t>
+            </a:r>
+          </a:p>
+          <a:p>
+            <a:pPr marL="342900" indent="-342900">
+              <a:buFont typeface="+mj-lt"/>
+              <a:buAutoNum type="arabicPeriod"/>
+            </a:pPr>
+            <a:r>
+              <a:rPr lang="es-ES" dirty="0"/>
+              <a:t>Cuadro de texto (Aquí se colocan los comandos SQL)</a:t>
+            </a:r>
+          </a:p>
+          <a:p>
+            <a:pPr marL="342900" indent="-342900">
+              <a:buFont typeface="+mj-lt"/>
+              <a:buAutoNum type="arabicPeriod"/>
+            </a:pPr>
+            <a:r>
+              <a:rPr lang="es-ES" dirty="0"/>
+              <a:t>Zona View donde se muestran los resultados.</a:t>
+            </a:r>
+          </a:p>
+          <a:p>
+            <a:pPr marL="342900" indent="-342900">
+              <a:buFont typeface="+mj-lt"/>
+              <a:buAutoNum type="arabicPeriod"/>
+            </a:pPr>
+            <a:endParaRPr lang="es-ES" dirty="0"/>
+          </a:p>
+        </p:txBody>
+      </p:sp>
     </p:spTree>
     <p:extLst>
       <p:ext uri="{BB962C8B-B14F-4D97-AF65-F5344CB8AC3E}">
-        <p14:creationId xmlns:p14="http://schemas.microsoft.com/office/powerpoint/2010/main" val="1804291840"/>
+        <p14:creationId xmlns:p14="http://schemas.microsoft.com/office/powerpoint/2010/main" val="1611437025"/>
       </p:ext>
     </p:extLst>
   </p:cSld>
@@ -4621,7 +4612,7 @@
         <p:spPr>
           <a:xfrm>
             <a:off x="181924" y="1914509"/>
-            <a:ext cx="6281399" cy="830997"/>
+            <a:ext cx="6281399" cy="2308324"/>
           </a:xfrm>
           <a:prstGeom prst="rect">
             <a:avLst/>
@@ -4636,17 +4627,26 @@
           <a:p>
             <a:r>
               <a:rPr lang="es-ES" sz="2400" dirty="0"/>
-              <a:t>La base de datos H2 también nos permite ejecutar las sentencias SQL que queramos.</a:t>
+              <a:t>Al pulsar sobre una tabla que hayamos creado, nuestro cuadro de texto pondrá esta sentencia SQL.</a:t>
+            </a:r>
+          </a:p>
+          <a:p>
+            <a:endParaRPr lang="es-ES" sz="2400" dirty="0"/>
+          </a:p>
+          <a:p>
+            <a:r>
+              <a:rPr lang="es-ES" sz="2400" dirty="0"/>
+              <a:t>Al presionar el botón de ‘Ejecutar’ nos mostrará el contenido de la tabla.</a:t>
             </a:r>
           </a:p>
         </p:txBody>
       </p:sp>
       <p:pic>
         <p:nvPicPr>
-          <p:cNvPr id="8" name="Imagen 7">
-            <a:extLst>
-              <a:ext uri="{FF2B5EF4-FFF2-40B4-BE49-F238E27FC236}">
-                <a16:creationId xmlns:a16="http://schemas.microsoft.com/office/drawing/2014/main" id="{0A66B84F-170B-45D9-B7B1-356FE31E276C}"/>
+          <p:cNvPr id="6" name="Imagen 5">
+            <a:extLst>
+              <a:ext uri="{FF2B5EF4-FFF2-40B4-BE49-F238E27FC236}">
+                <a16:creationId xmlns:a16="http://schemas.microsoft.com/office/drawing/2014/main" id="{60A8FBCF-7E45-485E-90BE-7FB60E7AC6CA}"/>
               </a:ext>
             </a:extLst>
           </p:cNvPr>
@@ -4663,12 +4663,12 @@
         </p:blipFill>
         <p:spPr>
           <a:xfrm>
-            <a:off x="272273" y="3213975"/>
-            <a:ext cx="4323760" cy="2421698"/>
+            <a:off x="6571857" y="2018210"/>
+            <a:ext cx="5462799" cy="3132128"/>
           </a:xfrm>
           <a:prstGeom prst="roundRect">
             <a:avLst>
-              <a:gd name="adj" fmla="val 8594"/>
+              <a:gd name="adj" fmla="val 5879"/>
             </a:avLst>
           </a:prstGeom>
           <a:solidFill>
@@ -4684,107 +4684,10 @@
           </a:effectLst>
         </p:spPr>
       </p:pic>
-      <p:pic>
-        <p:nvPicPr>
-          <p:cNvPr id="10" name="Imagen 9">
-            <a:extLst>
-              <a:ext uri="{FF2B5EF4-FFF2-40B4-BE49-F238E27FC236}">
-                <a16:creationId xmlns:a16="http://schemas.microsoft.com/office/drawing/2014/main" id="{72B03E60-4E29-4503-841A-A06EF9F95A4D}"/>
-              </a:ext>
-            </a:extLst>
-          </p:cNvPr>
-          <p:cNvPicPr>
-            <a:picLocks noChangeAspect="1"/>
-          </p:cNvPicPr>
-          <p:nvPr/>
-        </p:nvPicPr>
-        <p:blipFill>
-          <a:blip r:embed="rId3"/>
-          <a:stretch>
-            <a:fillRect/>
-          </a:stretch>
-        </p:blipFill>
-        <p:spPr>
-          <a:xfrm>
-            <a:off x="7593885" y="2362552"/>
-            <a:ext cx="3826483" cy="3506802"/>
-          </a:xfrm>
-          <a:prstGeom prst="roundRect">
-            <a:avLst>
-              <a:gd name="adj" fmla="val 2361"/>
-            </a:avLst>
-          </a:prstGeom>
-          <a:solidFill>
-            <a:srgbClr val="FFFFFF">
-              <a:shade val="85000"/>
-            </a:srgbClr>
-          </a:solidFill>
-          <a:ln>
-            <a:noFill/>
-          </a:ln>
-          <a:effectLst>
-            <a:reflection blurRad="12700" stA="38000" endPos="28000" dist="5000" dir="5400000" sy="-100000" algn="bl" rotWithShape="0"/>
-          </a:effectLst>
-        </p:spPr>
-      </p:pic>
-      <p:sp>
-        <p:nvSpPr>
-          <p:cNvPr id="11" name="Flecha: a la derecha 10">
-            <a:extLst>
-              <a:ext uri="{FF2B5EF4-FFF2-40B4-BE49-F238E27FC236}">
-                <a16:creationId xmlns:a16="http://schemas.microsoft.com/office/drawing/2014/main" id="{C7605F8E-A8D6-4AB8-A555-F59AA143E3E1}"/>
-              </a:ext>
-            </a:extLst>
-          </p:cNvPr>
-          <p:cNvSpPr/>
-          <p:nvPr/>
-        </p:nvSpPr>
-        <p:spPr>
-          <a:xfrm>
-            <a:off x="5050444" y="3284447"/>
-            <a:ext cx="2089030" cy="1951727"/>
-          </a:xfrm>
-          <a:prstGeom prst="rightArrow">
-            <a:avLst/>
-          </a:prstGeom>
-          <a:solidFill>
-            <a:schemeClr val="bg2">
-              <a:lumMod val="50000"/>
-            </a:schemeClr>
-          </a:solidFill>
-          <a:ln>
-            <a:noFill/>
-          </a:ln>
-        </p:spPr>
-        <p:style>
-          <a:lnRef idx="2">
-            <a:schemeClr val="accent1">
-              <a:shade val="50000"/>
-            </a:schemeClr>
-          </a:lnRef>
-          <a:fillRef idx="1">
-            <a:schemeClr val="accent1"/>
-          </a:fillRef>
-          <a:effectRef idx="0">
-            <a:schemeClr val="accent1"/>
-          </a:effectRef>
-          <a:fontRef idx="minor">
-            <a:schemeClr val="lt1"/>
-          </a:fontRef>
-        </p:style>
-        <p:txBody>
-          <a:bodyPr rtlCol="0" anchor="ctr"/>
-          <a:lstStyle/>
-          <a:p>
-            <a:pPr algn="ctr"/>
-            <a:endParaRPr lang="es-ES"/>
-          </a:p>
-        </p:txBody>
-      </p:sp>
     </p:spTree>
     <p:extLst>
       <p:ext uri="{BB962C8B-B14F-4D97-AF65-F5344CB8AC3E}">
-        <p14:creationId xmlns:p14="http://schemas.microsoft.com/office/powerpoint/2010/main" val="2121393783"/>
+        <p14:creationId xmlns:p14="http://schemas.microsoft.com/office/powerpoint/2010/main" val="1804291840"/>
       </p:ext>
     </p:extLst>
   </p:cSld>
@@ -4834,7 +4737,7 @@
           <a:p>
             <a:r>
               <a:rPr lang="es-ES" dirty="0"/>
-              <a:t>CÓDIGO JAVA PARA H2</a:t>
+              <a:t>Consola h2</a:t>
             </a:r>
           </a:p>
         </p:txBody>
@@ -4853,8 +4756,8 @@
         </p:nvSpPr>
         <p:spPr>
           <a:xfrm>
-            <a:off x="346047" y="1906694"/>
-            <a:ext cx="11267615" cy="830997"/>
+            <a:off x="181924" y="1914509"/>
+            <a:ext cx="6281399" cy="830997"/>
           </a:xfrm>
           <a:prstGeom prst="rect">
             <a:avLst/>
@@ -4869,17 +4772,17 @@
           <a:p>
             <a:r>
               <a:rPr lang="es-ES" sz="2400" dirty="0"/>
-              <a:t>Los pasos para conectar con la base de datos y modificarla son sencillas. Veamos como hacerlo. </a:t>
+              <a:t>La base de datos H2 también nos permite ejecutar las sentencias SQL que queramos.</a:t>
             </a:r>
           </a:p>
         </p:txBody>
       </p:sp>
       <p:pic>
         <p:nvPicPr>
-          <p:cNvPr id="5" name="Imagen 4">
-            <a:extLst>
-              <a:ext uri="{FF2B5EF4-FFF2-40B4-BE49-F238E27FC236}">
-                <a16:creationId xmlns:a16="http://schemas.microsoft.com/office/drawing/2014/main" id="{311A100C-1E78-4CC8-8835-89E92CE70E9B}"/>
+          <p:cNvPr id="8" name="Imagen 7">
+            <a:extLst>
+              <a:ext uri="{FF2B5EF4-FFF2-40B4-BE49-F238E27FC236}">
+                <a16:creationId xmlns:a16="http://schemas.microsoft.com/office/drawing/2014/main" id="{0A66B84F-170B-45D9-B7B1-356FE31E276C}"/>
               </a:ext>
             </a:extLst>
           </p:cNvPr>
@@ -4896,8 +4799,8 @@
         </p:blipFill>
         <p:spPr>
           <a:xfrm>
-            <a:off x="423983" y="3154183"/>
-            <a:ext cx="3521118" cy="315848"/>
+            <a:off x="272273" y="3213975"/>
+            <a:ext cx="4323760" cy="2421698"/>
           </a:xfrm>
           <a:prstGeom prst="roundRect">
             <a:avLst>
@@ -4917,60 +4820,12 @@
           </a:effectLst>
         </p:spPr>
       </p:pic>
-      <p:cxnSp>
-        <p:nvCxnSpPr>
-          <p:cNvPr id="7" name="Conector recto de flecha 6">
-            <a:extLst>
-              <a:ext uri="{FF2B5EF4-FFF2-40B4-BE49-F238E27FC236}">
-                <a16:creationId xmlns:a16="http://schemas.microsoft.com/office/drawing/2014/main" id="{1CBC246D-57A5-40BA-8F8F-2CB0B7034F56}"/>
-              </a:ext>
-            </a:extLst>
-          </p:cNvPr>
-          <p:cNvCxnSpPr>
-            <a:cxnSpLocks/>
-            <a:stCxn id="5" idx="3"/>
-            <a:endCxn id="12" idx="1"/>
-          </p:cNvCxnSpPr>
-          <p:nvPr/>
-        </p:nvCxnSpPr>
-        <p:spPr>
-          <a:xfrm>
-            <a:off x="3945101" y="3312107"/>
-            <a:ext cx="3042225" cy="39716"/>
-          </a:xfrm>
-          <a:prstGeom prst="straightConnector1">
-            <a:avLst/>
-          </a:prstGeom>
-          <a:ln w="76200">
-            <a:solidFill>
-              <a:schemeClr val="bg2">
-                <a:lumMod val="75000"/>
-              </a:schemeClr>
-            </a:solidFill>
-            <a:tailEnd type="triangle"/>
-          </a:ln>
-        </p:spPr>
-        <p:style>
-          <a:lnRef idx="1">
-            <a:schemeClr val="accent1"/>
-          </a:lnRef>
-          <a:fillRef idx="0">
-            <a:schemeClr val="accent1"/>
-          </a:fillRef>
-          <a:effectRef idx="0">
-            <a:schemeClr val="accent1"/>
-          </a:effectRef>
-          <a:fontRef idx="minor">
-            <a:schemeClr val="tx1"/>
-          </a:fontRef>
-        </p:style>
-      </p:cxnSp>
       <p:pic>
         <p:nvPicPr>
-          <p:cNvPr id="12" name="Imagen 11">
-            <a:extLst>
-              <a:ext uri="{FF2B5EF4-FFF2-40B4-BE49-F238E27FC236}">
-                <a16:creationId xmlns:a16="http://schemas.microsoft.com/office/drawing/2014/main" id="{362B1372-972F-405C-BA6A-A4724CF55882}"/>
+          <p:cNvPr id="10" name="Imagen 9">
+            <a:extLst>
+              <a:ext uri="{FF2B5EF4-FFF2-40B4-BE49-F238E27FC236}">
+                <a16:creationId xmlns:a16="http://schemas.microsoft.com/office/drawing/2014/main" id="{72B03E60-4E29-4503-841A-A06EF9F95A4D}"/>
               </a:ext>
             </a:extLst>
           </p:cNvPr>
@@ -4987,112 +4842,12 @@
         </p:blipFill>
         <p:spPr>
           <a:xfrm>
-            <a:off x="6987326" y="3163276"/>
-            <a:ext cx="4511145" cy="377093"/>
-          </a:xfrm>
-          <a:prstGeom prst="rect">
-            <a:avLst/>
-          </a:prstGeom>
-        </p:spPr>
-      </p:pic>
-      <p:sp>
-        <p:nvSpPr>
-          <p:cNvPr id="16" name="CuadroTexto 15">
-            <a:extLst>
-              <a:ext uri="{FF2B5EF4-FFF2-40B4-BE49-F238E27FC236}">
-                <a16:creationId xmlns:a16="http://schemas.microsoft.com/office/drawing/2014/main" id="{0AF983E0-6BE3-4054-AE90-99DB2FDB6B43}"/>
-              </a:ext>
-            </a:extLst>
-          </p:cNvPr>
-          <p:cNvSpPr txBox="1"/>
-          <p:nvPr/>
-        </p:nvSpPr>
-        <p:spPr>
-          <a:xfrm>
-            <a:off x="346047" y="2655689"/>
-            <a:ext cx="8026556" cy="461665"/>
-          </a:xfrm>
-          <a:prstGeom prst="rect">
-            <a:avLst/>
-          </a:prstGeom>
-          <a:noFill/>
-        </p:spPr>
-        <p:txBody>
-          <a:bodyPr wrap="none" rtlCol="0">
-            <a:spAutoFit/>
-          </a:bodyPr>
-          <a:lstStyle/>
-          <a:p>
-            <a:r>
-              <a:rPr lang="es-ES" sz="2400" dirty="0"/>
-              <a:t>Siempre empezamos conectándonos con la BD de esta forma:</a:t>
-            </a:r>
-          </a:p>
-        </p:txBody>
-      </p:sp>
-      <p:sp>
-        <p:nvSpPr>
-          <p:cNvPr id="18" name="CuadroTexto 17">
-            <a:extLst>
-              <a:ext uri="{FF2B5EF4-FFF2-40B4-BE49-F238E27FC236}">
-                <a16:creationId xmlns:a16="http://schemas.microsoft.com/office/drawing/2014/main" id="{F113A284-0E9F-4BFE-939C-2F5C9C815743}"/>
-              </a:ext>
-            </a:extLst>
-          </p:cNvPr>
-          <p:cNvSpPr txBox="1"/>
-          <p:nvPr/>
-        </p:nvSpPr>
-        <p:spPr>
-          <a:xfrm>
-            <a:off x="346047" y="3853859"/>
-            <a:ext cx="9351471" cy="461665"/>
-          </a:xfrm>
-          <a:prstGeom prst="rect">
-            <a:avLst/>
-          </a:prstGeom>
-          <a:noFill/>
-        </p:spPr>
-        <p:txBody>
-          <a:bodyPr wrap="none" rtlCol="0">
-            <a:spAutoFit/>
-          </a:bodyPr>
-          <a:lstStyle/>
-          <a:p>
-            <a:r>
-              <a:rPr lang="es-ES" sz="2400" dirty="0"/>
-              <a:t>Cuando acabemos de realizar las instrucciones SQL, se cierra la conexión:</a:t>
-            </a:r>
-          </a:p>
-        </p:txBody>
-      </p:sp>
-      <p:pic>
-        <p:nvPicPr>
-          <p:cNvPr id="20" name="Imagen 19">
-            <a:extLst>
-              <a:ext uri="{FF2B5EF4-FFF2-40B4-BE49-F238E27FC236}">
-                <a16:creationId xmlns:a16="http://schemas.microsoft.com/office/drawing/2014/main" id="{8F81DEAB-53F1-43E6-87CB-8E8F9B358DC9}"/>
-              </a:ext>
-            </a:extLst>
-          </p:cNvPr>
-          <p:cNvPicPr>
-            <a:picLocks noChangeAspect="1"/>
-          </p:cNvPicPr>
-          <p:nvPr/>
-        </p:nvPicPr>
-        <p:blipFill>
-          <a:blip r:embed="rId4"/>
-          <a:stretch>
-            <a:fillRect/>
-          </a:stretch>
-        </p:blipFill>
-        <p:spPr>
-          <a:xfrm>
-            <a:off x="3496419" y="4488336"/>
-            <a:ext cx="4415358" cy="1951540"/>
+            <a:off x="7593885" y="2362552"/>
+            <a:ext cx="3826483" cy="3506802"/>
           </a:xfrm>
           <a:prstGeom prst="roundRect">
             <a:avLst>
-              <a:gd name="adj" fmla="val 8594"/>
+              <a:gd name="adj" fmla="val 2361"/>
             </a:avLst>
           </a:prstGeom>
           <a:solidFill>
@@ -5108,10 +4863,64 @@
           </a:effectLst>
         </p:spPr>
       </p:pic>
+      <p:sp>
+        <p:nvSpPr>
+          <p:cNvPr id="11" name="Flecha: a la derecha 10">
+            <a:extLst>
+              <a:ext uri="{FF2B5EF4-FFF2-40B4-BE49-F238E27FC236}">
+                <a16:creationId xmlns:a16="http://schemas.microsoft.com/office/drawing/2014/main" id="{C7605F8E-A8D6-4AB8-A555-F59AA143E3E1}"/>
+              </a:ext>
+            </a:extLst>
+          </p:cNvPr>
+          <p:cNvSpPr/>
+          <p:nvPr/>
+        </p:nvSpPr>
+        <p:spPr>
+          <a:xfrm>
+            <a:off x="5050444" y="3284447"/>
+            <a:ext cx="2089030" cy="1951727"/>
+          </a:xfrm>
+          <a:prstGeom prst="rightArrow">
+            <a:avLst/>
+          </a:prstGeom>
+          <a:solidFill>
+            <a:schemeClr val="bg2">
+              <a:lumMod val="50000"/>
+            </a:schemeClr>
+          </a:solidFill>
+          <a:ln>
+            <a:noFill/>
+          </a:ln>
+        </p:spPr>
+        <p:style>
+          <a:lnRef idx="2">
+            <a:schemeClr val="accent1">
+              <a:shade val="50000"/>
+            </a:schemeClr>
+          </a:lnRef>
+          <a:fillRef idx="1">
+            <a:schemeClr val="accent1"/>
+          </a:fillRef>
+          <a:effectRef idx="0">
+            <a:schemeClr val="accent1"/>
+          </a:effectRef>
+          <a:fontRef idx="minor">
+            <a:schemeClr val="lt1"/>
+          </a:fontRef>
+        </p:style>
+        <p:txBody>
+          <a:bodyPr rtlCol="0" anchor="ctr"/>
+          <a:lstStyle/>
+          <a:p>
+            <a:pPr algn="ctr"/>
+            <a:endParaRPr lang="es-ES"/>
+          </a:p>
+        </p:txBody>
+      </p:sp>
     </p:spTree>
     <p:extLst>
       <p:ext uri="{BB962C8B-B14F-4D97-AF65-F5344CB8AC3E}">
-        <p14:creationId xmlns:p14="http://schemas.microsoft.com/office/powerpoint/2010/main" val="1076952748"/>
+        <p14:creationId xmlns:p14="http://schemas.microsoft.com/office/powerpoint/2010/main" val="2121393783"/>
       </p:ext>
     </p:extLst>
   </p:cSld>
@@ -5196,17 +5005,17 @@
           <a:p>
             <a:r>
               <a:rPr lang="es-ES" sz="2400" dirty="0"/>
-              <a:t>Las funciones básicas de esta BD (Insertar, Eliminar y Modificar) se hacen de la siguiente forma:</a:t>
+              <a:t>Los pasos para conectar con la base de datos y modificarla son sencillas. Veamos como hacerlo. </a:t>
             </a:r>
           </a:p>
         </p:txBody>
       </p:sp>
       <p:pic>
         <p:nvPicPr>
-          <p:cNvPr id="6" name="Imagen 5">
-            <a:extLst>
-              <a:ext uri="{FF2B5EF4-FFF2-40B4-BE49-F238E27FC236}">
-                <a16:creationId xmlns:a16="http://schemas.microsoft.com/office/drawing/2014/main" id="{BCC8DAB6-BD08-47CA-A79C-1902869E92E1}"/>
+          <p:cNvPr id="5" name="Imagen 4">
+            <a:extLst>
+              <a:ext uri="{FF2B5EF4-FFF2-40B4-BE49-F238E27FC236}">
+                <a16:creationId xmlns:a16="http://schemas.microsoft.com/office/drawing/2014/main" id="{311A100C-1E78-4CC8-8835-89E92CE70E9B}"/>
               </a:ext>
             </a:extLst>
           </p:cNvPr>
@@ -5223,8 +5032,8 @@
         </p:blipFill>
         <p:spPr>
           <a:xfrm>
-            <a:off x="1580878" y="3426872"/>
-            <a:ext cx="8590895" cy="2353818"/>
+            <a:off x="423983" y="3154183"/>
+            <a:ext cx="3521118" cy="315848"/>
           </a:xfrm>
           <a:prstGeom prst="roundRect">
             <a:avLst>
@@ -5244,12 +5053,90 @@
           </a:effectLst>
         </p:spPr>
       </p:pic>
-      <p:sp>
-        <p:nvSpPr>
-          <p:cNvPr id="13" name="CuadroTexto 12">
-            <a:extLst>
-              <a:ext uri="{FF2B5EF4-FFF2-40B4-BE49-F238E27FC236}">
-                <a16:creationId xmlns:a16="http://schemas.microsoft.com/office/drawing/2014/main" id="{7E038E41-AD90-4FE9-8157-5147705DD1D3}"/>
+      <p:cxnSp>
+        <p:nvCxnSpPr>
+          <p:cNvPr id="7" name="Conector recto de flecha 6">
+            <a:extLst>
+              <a:ext uri="{FF2B5EF4-FFF2-40B4-BE49-F238E27FC236}">
+                <a16:creationId xmlns:a16="http://schemas.microsoft.com/office/drawing/2014/main" id="{1CBC246D-57A5-40BA-8F8F-2CB0B7034F56}"/>
+              </a:ext>
+            </a:extLst>
+          </p:cNvPr>
+          <p:cNvCxnSpPr>
+            <a:cxnSpLocks/>
+            <a:stCxn id="5" idx="3"/>
+            <a:endCxn id="12" idx="1"/>
+          </p:cNvCxnSpPr>
+          <p:nvPr/>
+        </p:nvCxnSpPr>
+        <p:spPr>
+          <a:xfrm>
+            <a:off x="3945101" y="3312107"/>
+            <a:ext cx="3042225" cy="39716"/>
+          </a:xfrm>
+          <a:prstGeom prst="straightConnector1">
+            <a:avLst/>
+          </a:prstGeom>
+          <a:ln w="76200">
+            <a:solidFill>
+              <a:schemeClr val="bg2">
+                <a:lumMod val="75000"/>
+              </a:schemeClr>
+            </a:solidFill>
+            <a:tailEnd type="triangle"/>
+          </a:ln>
+        </p:spPr>
+        <p:style>
+          <a:lnRef idx="1">
+            <a:schemeClr val="accent1"/>
+          </a:lnRef>
+          <a:fillRef idx="0">
+            <a:schemeClr val="accent1"/>
+          </a:fillRef>
+          <a:effectRef idx="0">
+            <a:schemeClr val="accent1"/>
+          </a:effectRef>
+          <a:fontRef idx="minor">
+            <a:schemeClr val="tx1"/>
+          </a:fontRef>
+        </p:style>
+      </p:cxnSp>
+      <p:pic>
+        <p:nvPicPr>
+          <p:cNvPr id="12" name="Imagen 11">
+            <a:extLst>
+              <a:ext uri="{FF2B5EF4-FFF2-40B4-BE49-F238E27FC236}">
+                <a16:creationId xmlns:a16="http://schemas.microsoft.com/office/drawing/2014/main" id="{362B1372-972F-405C-BA6A-A4724CF55882}"/>
+              </a:ext>
+            </a:extLst>
+          </p:cNvPr>
+          <p:cNvPicPr>
+            <a:picLocks noChangeAspect="1"/>
+          </p:cNvPicPr>
+          <p:nvPr/>
+        </p:nvPicPr>
+        <p:blipFill>
+          <a:blip r:embed="rId3"/>
+          <a:stretch>
+            <a:fillRect/>
+          </a:stretch>
+        </p:blipFill>
+        <p:spPr>
+          <a:xfrm>
+            <a:off x="6987326" y="3163276"/>
+            <a:ext cx="4511145" cy="377093"/>
+          </a:xfrm>
+          <a:prstGeom prst="rect">
+            <a:avLst/>
+          </a:prstGeom>
+        </p:spPr>
+      </p:pic>
+      <p:sp>
+        <p:nvSpPr>
+          <p:cNvPr id="16" name="CuadroTexto 15">
+            <a:extLst>
+              <a:ext uri="{FF2B5EF4-FFF2-40B4-BE49-F238E27FC236}">
+                <a16:creationId xmlns:a16="http://schemas.microsoft.com/office/drawing/2014/main" id="{0AF983E0-6BE3-4054-AE90-99DB2FDB6B43}"/>
               </a:ext>
             </a:extLst>
           </p:cNvPr>
@@ -5258,8 +5145,8 @@
         </p:nvSpPr>
         <p:spPr>
           <a:xfrm>
-            <a:off x="803246" y="2851449"/>
-            <a:ext cx="11267615" cy="461665"/>
+            <a:off x="346047" y="2655689"/>
+            <a:ext cx="8026556" cy="461665"/>
           </a:xfrm>
           <a:prstGeom prst="rect">
             <a:avLst/>
@@ -5267,22 +5154,100 @@
           <a:noFill/>
         </p:spPr>
         <p:txBody>
-          <a:bodyPr wrap="square" rtlCol="0">
+          <a:bodyPr wrap="none" rtlCol="0">
             <a:spAutoFit/>
           </a:bodyPr>
           <a:lstStyle/>
           <a:p>
             <a:r>
               <a:rPr lang="es-ES" sz="2400" dirty="0"/>
-              <a:t>Insertar:</a:t>
-            </a:r>
-          </a:p>
-        </p:txBody>
-      </p:sp>
+              <a:t>Siempre empezamos conectándonos con la BD de esta forma:</a:t>
+            </a:r>
+          </a:p>
+        </p:txBody>
+      </p:sp>
+      <p:sp>
+        <p:nvSpPr>
+          <p:cNvPr id="18" name="CuadroTexto 17">
+            <a:extLst>
+              <a:ext uri="{FF2B5EF4-FFF2-40B4-BE49-F238E27FC236}">
+                <a16:creationId xmlns:a16="http://schemas.microsoft.com/office/drawing/2014/main" id="{F113A284-0E9F-4BFE-939C-2F5C9C815743}"/>
+              </a:ext>
+            </a:extLst>
+          </p:cNvPr>
+          <p:cNvSpPr txBox="1"/>
+          <p:nvPr/>
+        </p:nvSpPr>
+        <p:spPr>
+          <a:xfrm>
+            <a:off x="346047" y="3853859"/>
+            <a:ext cx="9351471" cy="461665"/>
+          </a:xfrm>
+          <a:prstGeom prst="rect">
+            <a:avLst/>
+          </a:prstGeom>
+          <a:noFill/>
+        </p:spPr>
+        <p:txBody>
+          <a:bodyPr wrap="none" rtlCol="0">
+            <a:spAutoFit/>
+          </a:bodyPr>
+          <a:lstStyle/>
+          <a:p>
+            <a:r>
+              <a:rPr lang="es-ES" sz="2400" dirty="0"/>
+              <a:t>Cuando acabemos de realizar las instrucciones SQL, se cierra la conexión:</a:t>
+            </a:r>
+          </a:p>
+        </p:txBody>
+      </p:sp>
+      <p:pic>
+        <p:nvPicPr>
+          <p:cNvPr id="20" name="Imagen 19">
+            <a:extLst>
+              <a:ext uri="{FF2B5EF4-FFF2-40B4-BE49-F238E27FC236}">
+                <a16:creationId xmlns:a16="http://schemas.microsoft.com/office/drawing/2014/main" id="{8F81DEAB-53F1-43E6-87CB-8E8F9B358DC9}"/>
+              </a:ext>
+            </a:extLst>
+          </p:cNvPr>
+          <p:cNvPicPr>
+            <a:picLocks noChangeAspect="1"/>
+          </p:cNvPicPr>
+          <p:nvPr/>
+        </p:nvPicPr>
+        <p:blipFill>
+          <a:blip r:embed="rId4"/>
+          <a:stretch>
+            <a:fillRect/>
+          </a:stretch>
+        </p:blipFill>
+        <p:spPr>
+          <a:xfrm>
+            <a:off x="3496419" y="4488336"/>
+            <a:ext cx="4415358" cy="1951540"/>
+          </a:xfrm>
+          <a:prstGeom prst="roundRect">
+            <a:avLst>
+              <a:gd name="adj" fmla="val 8594"/>
+            </a:avLst>
+          </a:prstGeom>
+          <a:solidFill>
+            <a:srgbClr val="FFFFFF">
+              <a:shade val="85000"/>
+            </a:srgbClr>
+          </a:solidFill>
+          <a:ln>
+            <a:noFill/>
+          </a:ln>
+          <a:effectLst>
+            <a:reflection blurRad="12700" stA="38000" endPos="28000" dist="5000" dir="5400000" sy="-100000" algn="bl" rotWithShape="0"/>
+          </a:effectLst>
+        </p:spPr>
+      </p:pic>
     </p:spTree>
     <p:extLst>
       <p:ext uri="{BB962C8B-B14F-4D97-AF65-F5344CB8AC3E}">
-        <p14:creationId xmlns:p14="http://schemas.microsoft.com/office/powerpoint/2010/main" val="28081459"/>
+        <p14:creationId xmlns:p14="http://schemas.microsoft.com/office/powerpoint/2010/main" val="1076952748"/>
       </p:ext>
     </p:extLst>
   </p:cSld>
@@ -5339,10 +5304,10 @@
       </p:sp>
       <p:sp>
         <p:nvSpPr>
-          <p:cNvPr id="13" name="CuadroTexto 12">
-            <a:extLst>
-              <a:ext uri="{FF2B5EF4-FFF2-40B4-BE49-F238E27FC236}">
-                <a16:creationId xmlns:a16="http://schemas.microsoft.com/office/drawing/2014/main" id="{7E038E41-AD90-4FE9-8157-5147705DD1D3}"/>
+          <p:cNvPr id="4" name="CuadroTexto 3">
+            <a:extLst>
+              <a:ext uri="{FF2B5EF4-FFF2-40B4-BE49-F238E27FC236}">
+                <a16:creationId xmlns:a16="http://schemas.microsoft.com/office/drawing/2014/main" id="{5A00C913-5A53-4DD7-9622-A80006EE214C}"/>
               </a:ext>
             </a:extLst>
           </p:cNvPr>
@@ -5351,8 +5316,8 @@
         </p:nvSpPr>
         <p:spPr>
           <a:xfrm>
-            <a:off x="461151" y="1917406"/>
-            <a:ext cx="11267615" cy="461665"/>
+            <a:off x="346047" y="1906694"/>
+            <a:ext cx="11267615" cy="830997"/>
           </a:xfrm>
           <a:prstGeom prst="rect">
             <a:avLst/>
@@ -5367,17 +5332,17 @@
           <a:p>
             <a:r>
               <a:rPr lang="es-ES" sz="2400" dirty="0"/>
-              <a:t>Eliminar:</a:t>
+              <a:t>Las funciones básicas de esta BD (Insertar, Eliminar y Modificar) se hacen de la siguiente forma:</a:t>
             </a:r>
           </a:p>
         </p:txBody>
       </p:sp>
       <p:pic>
         <p:nvPicPr>
-          <p:cNvPr id="5" name="Imagen 4">
-            <a:extLst>
-              <a:ext uri="{FF2B5EF4-FFF2-40B4-BE49-F238E27FC236}">
-                <a16:creationId xmlns:a16="http://schemas.microsoft.com/office/drawing/2014/main" id="{7E244985-FC56-42DB-882B-B089C38E2B17}"/>
+          <p:cNvPr id="6" name="Imagen 5">
+            <a:extLst>
+              <a:ext uri="{FF2B5EF4-FFF2-40B4-BE49-F238E27FC236}">
+                <a16:creationId xmlns:a16="http://schemas.microsoft.com/office/drawing/2014/main" id="{BCC8DAB6-BD08-47CA-A79C-1902869E92E1}"/>
               </a:ext>
             </a:extLst>
           </p:cNvPr>
@@ -5394,8 +5359,8 @@
         </p:blipFill>
         <p:spPr>
           <a:xfrm>
-            <a:off x="677279" y="2379071"/>
-            <a:ext cx="7694052" cy="1233397"/>
+            <a:off x="6437053" y="3576340"/>
+            <a:ext cx="5430674" cy="1487950"/>
           </a:xfrm>
           <a:prstGeom prst="roundRect">
             <a:avLst>
@@ -5415,12 +5380,47 @@
           </a:effectLst>
         </p:spPr>
       </p:pic>
+      <p:sp>
+        <p:nvSpPr>
+          <p:cNvPr id="13" name="CuadroTexto 12">
+            <a:extLst>
+              <a:ext uri="{FF2B5EF4-FFF2-40B4-BE49-F238E27FC236}">
+                <a16:creationId xmlns:a16="http://schemas.microsoft.com/office/drawing/2014/main" id="{7E038E41-AD90-4FE9-8157-5147705DD1D3}"/>
+              </a:ext>
+            </a:extLst>
+          </p:cNvPr>
+          <p:cNvSpPr txBox="1"/>
+          <p:nvPr/>
+        </p:nvSpPr>
+        <p:spPr>
+          <a:xfrm>
+            <a:off x="6558193" y="2851449"/>
+            <a:ext cx="5055470" cy="461665"/>
+          </a:xfrm>
+          <a:prstGeom prst="rect">
+            <a:avLst/>
+          </a:prstGeom>
+          <a:noFill/>
+        </p:spPr>
+        <p:txBody>
+          <a:bodyPr wrap="square" rtlCol="0">
+            <a:spAutoFit/>
+          </a:bodyPr>
+          <a:lstStyle/>
+          <a:p>
+            <a:r>
+              <a:rPr lang="es-ES" sz="2400" dirty="0"/>
+              <a:t>Insertar:</a:t>
+            </a:r>
+          </a:p>
+        </p:txBody>
+      </p:sp>
       <p:pic>
         <p:nvPicPr>
-          <p:cNvPr id="9" name="Imagen 8">
-            <a:extLst>
-              <a:ext uri="{FF2B5EF4-FFF2-40B4-BE49-F238E27FC236}">
-                <a16:creationId xmlns:a16="http://schemas.microsoft.com/office/drawing/2014/main" id="{6902FA67-EC0F-4567-BA8F-95095E965066}"/>
+          <p:cNvPr id="5" name="Imagen 4">
+            <a:extLst>
+              <a:ext uri="{FF2B5EF4-FFF2-40B4-BE49-F238E27FC236}">
+                <a16:creationId xmlns:a16="http://schemas.microsoft.com/office/drawing/2014/main" id="{B2748F9F-6DF0-49C7-9366-6405CC703E17}"/>
               </a:ext>
             </a:extLst>
           </p:cNvPr>
@@ -5437,8 +5437,8 @@
         </p:blipFill>
         <p:spPr>
           <a:xfrm>
-            <a:off x="599125" y="4475078"/>
-            <a:ext cx="9028865" cy="1745967"/>
+            <a:off x="346047" y="3568688"/>
+            <a:ext cx="5430673" cy="1682122"/>
           </a:xfrm>
           <a:prstGeom prst="roundRect">
             <a:avLst>
@@ -5460,6 +5460,220 @@
       </p:pic>
       <p:sp>
         <p:nvSpPr>
+          <p:cNvPr id="8" name="CuadroTexto 7">
+            <a:extLst>
+              <a:ext uri="{FF2B5EF4-FFF2-40B4-BE49-F238E27FC236}">
+                <a16:creationId xmlns:a16="http://schemas.microsoft.com/office/drawing/2014/main" id="{EDECBFFB-81D8-4516-AA3A-E10010269B09}"/>
+              </a:ext>
+            </a:extLst>
+          </p:cNvPr>
+          <p:cNvSpPr txBox="1"/>
+          <p:nvPr/>
+        </p:nvSpPr>
+        <p:spPr>
+          <a:xfrm>
+            <a:off x="346047" y="2916794"/>
+            <a:ext cx="5055470" cy="461665"/>
+          </a:xfrm>
+          <a:prstGeom prst="rect">
+            <a:avLst/>
+          </a:prstGeom>
+          <a:noFill/>
+        </p:spPr>
+        <p:txBody>
+          <a:bodyPr wrap="square" rtlCol="0">
+            <a:spAutoFit/>
+          </a:bodyPr>
+          <a:lstStyle/>
+          <a:p>
+            <a:r>
+              <a:rPr lang="es-ES" sz="2400" dirty="0"/>
+              <a:t>Visualizar:</a:t>
+            </a:r>
+          </a:p>
+        </p:txBody>
+      </p:sp>
+    </p:spTree>
+    <p:extLst>
+      <p:ext uri="{BB962C8B-B14F-4D97-AF65-F5344CB8AC3E}">
+        <p14:creationId xmlns:p14="http://schemas.microsoft.com/office/powerpoint/2010/main" val="28081459"/>
+      </p:ext>
+    </p:extLst>
+  </p:cSld>
+  <p:clrMapOvr>
+    <a:masterClrMapping/>
+  </p:clrMapOvr>
+</p:sld>
+</file>
+
+<file path=ppt/slides/slide18.xml><?xml version="1.0" encoding="utf-8"?>
+<p:sld xmlns:a="http://schemas.openxmlformats.org/drawingml/2006/main" xmlns:r="http://schemas.openxmlformats.org/officeDocument/2006/relationships" xmlns:p="http://schemas.openxmlformats.org/presentationml/2006/main">
+  <p:cSld>
+    <p:spTree>
+      <p:nvGrpSpPr>
+        <p:cNvPr id="1" name=""/>
+        <p:cNvGrpSpPr/>
+        <p:nvPr/>
+      </p:nvGrpSpPr>
+      <p:grpSpPr>
+        <a:xfrm>
+          <a:off x="0" y="0"/>
+          <a:ext cx="0" cy="0"/>
+          <a:chOff x="0" y="0"/>
+          <a:chExt cx="0" cy="0"/>
+        </a:xfrm>
+      </p:grpSpPr>
+      <p:sp>
+        <p:nvSpPr>
+          <p:cNvPr id="2" name="Título 1">
+            <a:extLst>
+              <a:ext uri="{FF2B5EF4-FFF2-40B4-BE49-F238E27FC236}">
+                <a16:creationId xmlns:a16="http://schemas.microsoft.com/office/drawing/2014/main" id="{152712B1-5BFD-4504-A51F-5CBE8292E7CE}"/>
+              </a:ext>
+            </a:extLst>
+          </p:cNvPr>
+          <p:cNvSpPr>
+            <a:spLocks noGrp="1"/>
+          </p:cNvSpPr>
+          <p:nvPr>
+            <p:ph type="title"/>
+          </p:nvPr>
+        </p:nvSpPr>
+        <p:spPr/>
+        <p:txBody>
+          <a:bodyPr/>
+          <a:lstStyle/>
+          <a:p>
+            <a:r>
+              <a:rPr lang="es-ES" dirty="0"/>
+              <a:t>CÓDIGO JAVA PARA H2</a:t>
+            </a:r>
+          </a:p>
+        </p:txBody>
+      </p:sp>
+      <p:sp>
+        <p:nvSpPr>
+          <p:cNvPr id="13" name="CuadroTexto 12">
+            <a:extLst>
+              <a:ext uri="{FF2B5EF4-FFF2-40B4-BE49-F238E27FC236}">
+                <a16:creationId xmlns:a16="http://schemas.microsoft.com/office/drawing/2014/main" id="{7E038E41-AD90-4FE9-8157-5147705DD1D3}"/>
+              </a:ext>
+            </a:extLst>
+          </p:cNvPr>
+          <p:cNvSpPr txBox="1"/>
+          <p:nvPr/>
+        </p:nvSpPr>
+        <p:spPr>
+          <a:xfrm>
+            <a:off x="461151" y="1917406"/>
+            <a:ext cx="11267615" cy="461665"/>
+          </a:xfrm>
+          <a:prstGeom prst="rect">
+            <a:avLst/>
+          </a:prstGeom>
+          <a:noFill/>
+        </p:spPr>
+        <p:txBody>
+          <a:bodyPr wrap="square" rtlCol="0">
+            <a:spAutoFit/>
+          </a:bodyPr>
+          <a:lstStyle/>
+          <a:p>
+            <a:r>
+              <a:rPr lang="es-ES" sz="2400" dirty="0"/>
+              <a:t>Eliminar:</a:t>
+            </a:r>
+          </a:p>
+        </p:txBody>
+      </p:sp>
+      <p:pic>
+        <p:nvPicPr>
+          <p:cNvPr id="5" name="Imagen 4">
+            <a:extLst>
+              <a:ext uri="{FF2B5EF4-FFF2-40B4-BE49-F238E27FC236}">
+                <a16:creationId xmlns:a16="http://schemas.microsoft.com/office/drawing/2014/main" id="{7E244985-FC56-42DB-882B-B089C38E2B17}"/>
+              </a:ext>
+            </a:extLst>
+          </p:cNvPr>
+          <p:cNvPicPr>
+            <a:picLocks noChangeAspect="1"/>
+          </p:cNvPicPr>
+          <p:nvPr/>
+        </p:nvPicPr>
+        <p:blipFill>
+          <a:blip r:embed="rId2"/>
+          <a:stretch>
+            <a:fillRect/>
+          </a:stretch>
+        </p:blipFill>
+        <p:spPr>
+          <a:xfrm>
+            <a:off x="677279" y="2379071"/>
+            <a:ext cx="7694052" cy="1233397"/>
+          </a:xfrm>
+          <a:prstGeom prst="roundRect">
+            <a:avLst>
+              <a:gd name="adj" fmla="val 8594"/>
+            </a:avLst>
+          </a:prstGeom>
+          <a:solidFill>
+            <a:srgbClr val="FFFFFF">
+              <a:shade val="85000"/>
+            </a:srgbClr>
+          </a:solidFill>
+          <a:ln>
+            <a:noFill/>
+          </a:ln>
+          <a:effectLst>
+            <a:reflection blurRad="12700" stA="38000" endPos="28000" dist="5000" dir="5400000" sy="-100000" algn="bl" rotWithShape="0"/>
+          </a:effectLst>
+        </p:spPr>
+      </p:pic>
+      <p:pic>
+        <p:nvPicPr>
+          <p:cNvPr id="9" name="Imagen 8">
+            <a:extLst>
+              <a:ext uri="{FF2B5EF4-FFF2-40B4-BE49-F238E27FC236}">
+                <a16:creationId xmlns:a16="http://schemas.microsoft.com/office/drawing/2014/main" id="{6902FA67-EC0F-4567-BA8F-95095E965066}"/>
+              </a:ext>
+            </a:extLst>
+          </p:cNvPr>
+          <p:cNvPicPr>
+            <a:picLocks noChangeAspect="1"/>
+          </p:cNvPicPr>
+          <p:nvPr/>
+        </p:nvPicPr>
+        <p:blipFill>
+          <a:blip r:embed="rId3"/>
+          <a:stretch>
+            <a:fillRect/>
+          </a:stretch>
+        </p:blipFill>
+        <p:spPr>
+          <a:xfrm>
+            <a:off x="599125" y="4475078"/>
+            <a:ext cx="9028865" cy="1745967"/>
+          </a:xfrm>
+          <a:prstGeom prst="roundRect">
+            <a:avLst>
+              <a:gd name="adj" fmla="val 8594"/>
+            </a:avLst>
+          </a:prstGeom>
+          <a:solidFill>
+            <a:srgbClr val="FFFFFF">
+              <a:shade val="85000"/>
+            </a:srgbClr>
+          </a:solidFill>
+          <a:ln>
+            <a:noFill/>
+          </a:ln>
+          <a:effectLst>
+            <a:reflection blurRad="12700" stA="38000" endPos="28000" dist="5000" dir="5400000" sy="-100000" algn="bl" rotWithShape="0"/>
+          </a:effectLst>
+        </p:spPr>
+      </p:pic>
+      <p:sp>
+        <p:nvSpPr>
           <p:cNvPr id="7" name="CuadroTexto 6">
             <a:extLst>
               <a:ext uri="{FF2B5EF4-FFF2-40B4-BE49-F238E27FC236}">
@@ -5506,7 +5720,7 @@
 </p:sld>
 </file>
 
-<file path=ppt/slides/slide18.xml><?xml version="1.0" encoding="utf-8"?>
+<file path=ppt/slides/slide19.xml><?xml version="1.0" encoding="utf-8"?>
 <p:sld xmlns:a="http://schemas.openxmlformats.org/drawingml/2006/main" xmlns:r="http://schemas.openxmlformats.org/officeDocument/2006/relationships" xmlns:p="http://schemas.openxmlformats.org/presentationml/2006/main">
   <p:cSld>
     <p:spTree>
@@ -5651,7 +5865,9 @@
           </a:xfrm>
         </p:spPr>
         <p:txBody>
-          <a:bodyPr/>
+          <a:bodyPr>
+            <a:normAutofit lnSpcReduction="10000"/>
+          </a:bodyPr>
           <a:lstStyle/>
           <a:p>
             <a:pPr marL="285750" indent="-285750">
@@ -5661,6 +5877,16 @@
             <a:r>
               <a:rPr lang="es-ES" dirty="0"/>
               <a:t>¿Qué es H2?</a:t>
+            </a:r>
+          </a:p>
+          <a:p>
+            <a:pPr marL="285750" indent="-285750">
+              <a:buFont typeface="Arial" panose="020B0604020202020204" pitchFamily="34" charset="0"/>
+              <a:buChar char="•"/>
+            </a:pPr>
+            <a:r>
+              <a:rPr lang="es-ES" dirty="0"/>
+              <a:t>Un poco de historia</a:t>
             </a:r>
           </a:p>
           <a:p>
@@ -5918,7 +6144,7 @@
             </a:pPr>
             <a:r>
               <a:rPr lang="es-ES" sz="2800" dirty="0"/>
-              <a:t>Su última versión estable es la 2.1.210 (2022-01-17) publicada el 17 de Enero de 2022</a:t>
+              <a:t>Su última versión estable es la 2.1.210 publicada el 17 de Enero de 2022</a:t>
             </a:r>
           </a:p>
         </p:txBody>
@@ -5958,7 +6184,7 @@
           <p:cNvPr id="2" name="Título 1">
             <a:extLst>
               <a:ext uri="{FF2B5EF4-FFF2-40B4-BE49-F238E27FC236}">
-                <a16:creationId xmlns:a16="http://schemas.microsoft.com/office/drawing/2014/main" id="{31D8B7DB-44F2-420E-B492-E4870413ECFE}"/>
+                <a16:creationId xmlns:a16="http://schemas.microsoft.com/office/drawing/2014/main" id="{3A2302D8-918A-4F77-93A9-56B4A82F2FC1}"/>
               </a:ext>
             </a:extLst>
           </p:cNvPr>
@@ -5976,7 +6202,7 @@
           <a:p>
             <a:r>
               <a:rPr lang="es-ES" dirty="0"/>
-              <a:t>Pasos de la instalación</a:t>
+              <a:t>Un poco de historia…</a:t>
             </a:r>
           </a:p>
         </p:txBody>
@@ -5986,7 +6212,7 @@
           <p:cNvPr id="3" name="CuadroTexto 2">
             <a:extLst>
               <a:ext uri="{FF2B5EF4-FFF2-40B4-BE49-F238E27FC236}">
-                <a16:creationId xmlns:a16="http://schemas.microsoft.com/office/drawing/2014/main" id="{0068F14C-1799-4CF2-A91F-021E6510FAF4}"/>
+                <a16:creationId xmlns:a16="http://schemas.microsoft.com/office/drawing/2014/main" id="{13B2C4B9-2496-4111-B26A-9C9A52F65317}"/>
               </a:ext>
             </a:extLst>
           </p:cNvPr>
@@ -5995,8 +6221,8 @@
         </p:nvSpPr>
         <p:spPr>
           <a:xfrm>
-            <a:off x="650450" y="2309567"/>
-            <a:ext cx="5444510" cy="3416320"/>
+            <a:off x="622169" y="2479249"/>
+            <a:ext cx="9784080" cy="3539430"/>
           </a:xfrm>
           <a:prstGeom prst="rect">
             <a:avLst/>
@@ -6009,175 +6235,84 @@
           </a:bodyPr>
           <a:lstStyle/>
           <a:p>
-            <a:pPr marL="285750" indent="-285750">
+            <a:pPr marL="457200" indent="-457200">
               <a:buFont typeface="Arial" panose="020B0604020202020204" pitchFamily="34" charset="0"/>
               <a:buChar char="•"/>
             </a:pPr>
             <a:r>
-              <a:rPr lang="es-ES" sz="2400" dirty="0"/>
-              <a:t>Visita la página oficial de H2 y descarga  el instalador. (Nuestro equipo podría intentar evitar que ejecutemos el instalador)</a:t>
-            </a:r>
-          </a:p>
-          <a:p>
-            <a:pPr marL="285750" indent="-285750">
+              <a:rPr lang="es-ES" sz="2800" dirty="0"/>
+              <a:t>Thomas Mueller fue el creador de esta base de datos, que también fue creador de </a:t>
+            </a:r>
+            <a:r>
+              <a:rPr lang="es-ES" sz="2800" dirty="0" err="1"/>
+              <a:t>Hipersonic</a:t>
+            </a:r>
+            <a:r>
+              <a:rPr lang="es-ES" sz="2800" dirty="0"/>
+              <a:t> SQL.</a:t>
+            </a:r>
+          </a:p>
+          <a:p>
+            <a:pPr marL="457200" indent="-457200">
               <a:buFont typeface="Arial" panose="020B0604020202020204" pitchFamily="34" charset="0"/>
               <a:buChar char="•"/>
             </a:pPr>
-            <a:endParaRPr lang="es-ES" sz="2400" dirty="0"/>
-          </a:p>
-          <a:p>
-            <a:pPr marL="285750" indent="-285750">
+            <a:endParaRPr lang="es-ES" sz="2800" dirty="0"/>
+          </a:p>
+          <a:p>
+            <a:pPr marL="457200" indent="-457200">
               <a:buFont typeface="Arial" panose="020B0604020202020204" pitchFamily="34" charset="0"/>
               <a:buChar char="•"/>
             </a:pPr>
-            <a:endParaRPr lang="es-ES" sz="2400" dirty="0"/>
-          </a:p>
-          <a:p>
-            <a:pPr marL="285750" indent="-285750">
+            <a:r>
+              <a:rPr lang="es-ES" sz="2800" dirty="0"/>
+              <a:t>Su desarrollo comenzó en Mayo, 2004 pero acabó en Diciembre de 2005</a:t>
+            </a:r>
+          </a:p>
+          <a:p>
+            <a:pPr marL="457200" indent="-457200">
               <a:buFont typeface="Arial" panose="020B0604020202020204" pitchFamily="34" charset="0"/>
               <a:buChar char="•"/>
             </a:pPr>
-            <a:endParaRPr lang="es-ES" sz="2400" dirty="0"/>
-          </a:p>
-          <a:p>
-            <a:pPr marL="285750" indent="-285750">
+            <a:endParaRPr lang="es-ES" sz="2800" dirty="0"/>
+          </a:p>
+          <a:p>
+            <a:pPr marL="457200" indent="-457200">
               <a:buFont typeface="Arial" panose="020B0604020202020204" pitchFamily="34" charset="0"/>
               <a:buChar char="•"/>
             </a:pPr>
             <a:r>
-              <a:rPr lang="es-ES" sz="2400" b="0" i="0" u="none" strike="noStrike" dirty="0">
-                <a:solidFill>
-                  <a:srgbClr val="4784E8"/>
-                </a:solidFill>
-                <a:effectLst/>
-                <a:latin typeface="Roboto Slab"/>
-                <a:hlinkClick r:id="rId2"/>
-              </a:rPr>
-              <a:t>http://www.h2database.com</a:t>
-            </a:r>
-            <a:endParaRPr lang="es-ES" sz="2400" b="0" i="0" u="none" strike="noStrike" dirty="0">
-              <a:solidFill>
-                <a:srgbClr val="4784E8"/>
-              </a:solidFill>
-              <a:effectLst/>
-              <a:latin typeface="Roboto Slab"/>
-            </a:endParaRPr>
-          </a:p>
-          <a:p>
-            <a:pPr marL="285750" indent="-285750">
-              <a:buFont typeface="Arial" panose="020B0604020202020204" pitchFamily="34" charset="0"/>
-              <a:buChar char="•"/>
-            </a:pPr>
-            <a:endParaRPr lang="es-ES" sz="2400" dirty="0"/>
-          </a:p>
-        </p:txBody>
-      </p:sp>
-      <p:pic>
-        <p:nvPicPr>
-          <p:cNvPr id="5" name="Imagen 4">
-            <a:extLst>
-              <a:ext uri="{FF2B5EF4-FFF2-40B4-BE49-F238E27FC236}">
-                <a16:creationId xmlns:a16="http://schemas.microsoft.com/office/drawing/2014/main" id="{FCBD01C0-65FF-4E7D-97BC-AA1A103F0C9A}"/>
-              </a:ext>
-            </a:extLst>
-          </p:cNvPr>
-          <p:cNvPicPr>
-            <a:picLocks noChangeAspect="1"/>
-          </p:cNvPicPr>
-          <p:nvPr/>
-        </p:nvPicPr>
-        <p:blipFill>
-          <a:blip r:embed="rId3"/>
-          <a:stretch>
-            <a:fillRect/>
-          </a:stretch>
-        </p:blipFill>
-        <p:spPr>
-          <a:xfrm>
-            <a:off x="6094959" y="1585528"/>
-            <a:ext cx="5039548" cy="4375554"/>
-          </a:xfrm>
-          <a:prstGeom prst="roundRect">
-            <a:avLst>
-              <a:gd name="adj" fmla="val 3854"/>
-            </a:avLst>
-          </a:prstGeom>
-          <a:solidFill>
-            <a:srgbClr val="FFFFFF">
-              <a:shade val="85000"/>
-            </a:srgbClr>
-          </a:solidFill>
-          <a:ln>
-            <a:solidFill>
-              <a:schemeClr val="bg1"/>
-            </a:solidFill>
-          </a:ln>
-          <a:effectLst>
-            <a:reflection blurRad="12700" stA="38000" endPos="28000" dist="5000" dir="5400000" sy="-100000" algn="bl" rotWithShape="0"/>
-          </a:effectLst>
-        </p:spPr>
-      </p:pic>
-      <p:sp>
-        <p:nvSpPr>
-          <p:cNvPr id="6" name="Flecha: a la derecha 5">
-            <a:extLst>
-              <a:ext uri="{FF2B5EF4-FFF2-40B4-BE49-F238E27FC236}">
-                <a16:creationId xmlns:a16="http://schemas.microsoft.com/office/drawing/2014/main" id="{2A61E112-5E40-4C16-8ABE-DDCE2281328F}"/>
-              </a:ext>
-            </a:extLst>
-          </p:cNvPr>
-          <p:cNvSpPr/>
-          <p:nvPr/>
-        </p:nvSpPr>
-        <p:spPr>
-          <a:xfrm rot="19890488">
-            <a:off x="4631787" y="3915778"/>
-            <a:ext cx="3115831" cy="1001648"/>
-          </a:xfrm>
-          <a:prstGeom prst="rightArrow">
-            <a:avLst>
-              <a:gd name="adj1" fmla="val 46494"/>
-              <a:gd name="adj2" fmla="val 89164"/>
-            </a:avLst>
-          </a:prstGeom>
-          <a:solidFill>
-            <a:schemeClr val="bg2">
-              <a:lumMod val="75000"/>
-            </a:schemeClr>
-          </a:solidFill>
-          <a:ln>
-            <a:noFill/>
-          </a:ln>
-        </p:spPr>
-        <p:style>
-          <a:lnRef idx="2">
-            <a:schemeClr val="accent1">
-              <a:shade val="50000"/>
-            </a:schemeClr>
-          </a:lnRef>
-          <a:fillRef idx="1">
-            <a:schemeClr val="accent1"/>
-          </a:fillRef>
-          <a:effectRef idx="0">
-            <a:schemeClr val="accent1"/>
-          </a:effectRef>
-          <a:fontRef idx="minor">
-            <a:schemeClr val="lt1"/>
-          </a:fontRef>
-        </p:style>
-        <p:txBody>
-          <a:bodyPr rtlCol="0" anchor="ctr"/>
-          <a:lstStyle/>
-          <a:p>
-            <a:pPr algn="ctr"/>
-            <a:endParaRPr lang="es-ES"/>
+              <a:rPr lang="es-ES" sz="2800" dirty="0"/>
+              <a:t>El nombre H2 viene de “</a:t>
+            </a:r>
+            <a:r>
+              <a:rPr lang="es-ES" sz="2800" dirty="0" err="1"/>
+              <a:t>Hipersonic</a:t>
+            </a:r>
+            <a:r>
+              <a:rPr lang="es-ES" sz="2800" dirty="0"/>
+              <a:t> 2”, aunque no comparte ni reutiliza código de </a:t>
+            </a:r>
+            <a:r>
+              <a:rPr lang="es-ES" sz="2800" dirty="0" err="1"/>
+              <a:t>Hipersonic</a:t>
+            </a:r>
+            <a:r>
+              <a:rPr lang="es-ES" sz="2800" dirty="0"/>
+              <a:t> SQL. Fue creado </a:t>
+            </a:r>
+            <a:r>
+              <a:rPr lang="es-ES" sz="2800"/>
+              <a:t>desde cero.</a:t>
+            </a:r>
+            <a:endParaRPr lang="es-ES" sz="2800" dirty="0"/>
           </a:p>
         </p:txBody>
       </p:sp>
     </p:spTree>
     <p:extLst>
       <p:ext uri="{BB962C8B-B14F-4D97-AF65-F5344CB8AC3E}">
-        <p14:creationId xmlns:p14="http://schemas.microsoft.com/office/powerpoint/2010/main" val="2600024065"/>
+        <p14:creationId xmlns:p14="http://schemas.microsoft.com/office/powerpoint/2010/main" val="1728324779"/>
       </p:ext>
     </p:extLst>
   </p:cSld>
@@ -6247,7 +6382,7 @@
         <p:spPr>
           <a:xfrm>
             <a:off x="650450" y="2309567"/>
-            <a:ext cx="5444510" cy="461665"/>
+            <a:ext cx="5444510" cy="3416320"/>
           </a:xfrm>
           <a:prstGeom prst="rect">
             <a:avLst/>
@@ -6266,60 +6401,69 @@
             </a:pPr>
             <a:r>
               <a:rPr lang="es-ES" sz="2400" dirty="0"/>
-              <a:t>Seguimos los pasos de instalación:</a:t>
-            </a:r>
+              <a:t>Visita la página oficial de H2 y descarga  el instalador. (Nuestro equipo podría intentar evitar que ejecutemos el instalador)</a:t>
+            </a:r>
+          </a:p>
+          <a:p>
+            <a:pPr marL="285750" indent="-285750">
+              <a:buFont typeface="Arial" panose="020B0604020202020204" pitchFamily="34" charset="0"/>
+              <a:buChar char="•"/>
+            </a:pPr>
+            <a:endParaRPr lang="es-ES" sz="2400" dirty="0"/>
+          </a:p>
+          <a:p>
+            <a:pPr marL="285750" indent="-285750">
+              <a:buFont typeface="Arial" panose="020B0604020202020204" pitchFamily="34" charset="0"/>
+              <a:buChar char="•"/>
+            </a:pPr>
+            <a:endParaRPr lang="es-ES" sz="2400" dirty="0"/>
+          </a:p>
+          <a:p>
+            <a:pPr marL="285750" indent="-285750">
+              <a:buFont typeface="Arial" panose="020B0604020202020204" pitchFamily="34" charset="0"/>
+              <a:buChar char="•"/>
+            </a:pPr>
+            <a:endParaRPr lang="es-ES" sz="2400" dirty="0"/>
+          </a:p>
+          <a:p>
+            <a:pPr marL="285750" indent="-285750">
+              <a:buFont typeface="Arial" panose="020B0604020202020204" pitchFamily="34" charset="0"/>
+              <a:buChar char="•"/>
+            </a:pPr>
+            <a:r>
+              <a:rPr lang="es-ES" sz="2400" b="0" i="0" u="none" strike="noStrike" dirty="0">
+                <a:solidFill>
+                  <a:srgbClr val="4784E8"/>
+                </a:solidFill>
+                <a:effectLst/>
+                <a:latin typeface="Roboto Slab"/>
+                <a:hlinkClick r:id="rId2"/>
+              </a:rPr>
+              <a:t>http://www.h2database.com</a:t>
+            </a:r>
+            <a:endParaRPr lang="es-ES" sz="2400" b="0" i="0" u="none" strike="noStrike" dirty="0">
+              <a:solidFill>
+                <a:srgbClr val="4784E8"/>
+              </a:solidFill>
+              <a:effectLst/>
+              <a:latin typeface="Roboto Slab"/>
+            </a:endParaRPr>
+          </a:p>
+          <a:p>
+            <a:pPr marL="285750" indent="-285750">
+              <a:buFont typeface="Arial" panose="020B0604020202020204" pitchFamily="34" charset="0"/>
+              <a:buChar char="•"/>
+            </a:pPr>
+            <a:endParaRPr lang="es-ES" sz="2400" dirty="0"/>
           </a:p>
         </p:txBody>
       </p:sp>
       <p:pic>
         <p:nvPicPr>
-          <p:cNvPr id="6" name="Imagen 5">
-            <a:extLst>
-              <a:ext uri="{FF2B5EF4-FFF2-40B4-BE49-F238E27FC236}">
-                <a16:creationId xmlns:a16="http://schemas.microsoft.com/office/drawing/2014/main" id="{4FA09AA6-8009-4C9D-BF21-395FC1E11BBC}"/>
-              </a:ext>
-            </a:extLst>
-          </p:cNvPr>
-          <p:cNvPicPr>
-            <a:picLocks noChangeAspect="1"/>
-          </p:cNvPicPr>
-          <p:nvPr/>
-        </p:nvPicPr>
-        <p:blipFill>
-          <a:blip r:embed="rId2"/>
-          <a:stretch>
-            <a:fillRect/>
-          </a:stretch>
-        </p:blipFill>
-        <p:spPr>
-          <a:xfrm>
-            <a:off x="509048" y="2922676"/>
-            <a:ext cx="4740051" cy="3665538"/>
-          </a:xfrm>
-          <a:prstGeom prst="roundRect">
-            <a:avLst>
-              <a:gd name="adj" fmla="val 3193"/>
-            </a:avLst>
-          </a:prstGeom>
-          <a:solidFill>
-            <a:srgbClr val="FFFFFF">
-              <a:shade val="85000"/>
-            </a:srgbClr>
-          </a:solidFill>
-          <a:ln>
-            <a:noFill/>
-          </a:ln>
-          <a:effectLst>
-            <a:reflection blurRad="12700" stA="38000" endPos="28000" dist="5000" dir="5400000" sy="-100000" algn="bl" rotWithShape="0"/>
-          </a:effectLst>
-        </p:spPr>
-      </p:pic>
-      <p:pic>
-        <p:nvPicPr>
-          <p:cNvPr id="8" name="Imagen 7">
-            <a:extLst>
-              <a:ext uri="{FF2B5EF4-FFF2-40B4-BE49-F238E27FC236}">
-                <a16:creationId xmlns:a16="http://schemas.microsoft.com/office/drawing/2014/main" id="{3F3C5E35-4D1B-443E-B4BC-F1DA43B68B84}"/>
+          <p:cNvPr id="5" name="Imagen 4">
+            <a:extLst>
+              <a:ext uri="{FF2B5EF4-FFF2-40B4-BE49-F238E27FC236}">
+                <a16:creationId xmlns:a16="http://schemas.microsoft.com/office/drawing/2014/main" id="{FCBD01C0-65FF-4E7D-97BC-AA1A103F0C9A}"/>
               </a:ext>
             </a:extLst>
           </p:cNvPr>
@@ -6336,12 +6480,12 @@
         </p:blipFill>
         <p:spPr>
           <a:xfrm>
-            <a:off x="7095756" y="2915905"/>
-            <a:ext cx="4701947" cy="3657917"/>
+            <a:off x="6094959" y="1585528"/>
+            <a:ext cx="5039548" cy="4375554"/>
           </a:xfrm>
           <a:prstGeom prst="roundRect">
             <a:avLst>
-              <a:gd name="adj" fmla="val 3440"/>
+              <a:gd name="adj" fmla="val 3854"/>
             </a:avLst>
           </a:prstGeom>
           <a:solidFill>
@@ -6350,7 +6494,9 @@
             </a:srgbClr>
           </a:solidFill>
           <a:ln>
-            <a:noFill/>
+            <a:solidFill>
+              <a:schemeClr val="bg1"/>
+            </a:solidFill>
           </a:ln>
           <a:effectLst>
             <a:reflection blurRad="12700" stA="38000" endPos="28000" dist="5000" dir="5400000" sy="-100000" algn="bl" rotWithShape="0"/>
@@ -6359,10 +6505,10 @@
       </p:pic>
       <p:sp>
         <p:nvSpPr>
-          <p:cNvPr id="11" name="Flecha: a la derecha 10">
-            <a:extLst>
-              <a:ext uri="{FF2B5EF4-FFF2-40B4-BE49-F238E27FC236}">
-                <a16:creationId xmlns:a16="http://schemas.microsoft.com/office/drawing/2014/main" id="{2ADE3556-5D12-4BC8-93D7-4FC1F58BE9AD}"/>
+          <p:cNvPr id="6" name="Flecha: a la derecha 5">
+            <a:extLst>
+              <a:ext uri="{FF2B5EF4-FFF2-40B4-BE49-F238E27FC236}">
+                <a16:creationId xmlns:a16="http://schemas.microsoft.com/office/drawing/2014/main" id="{2A61E112-5E40-4C16-8ABE-DDCE2281328F}"/>
               </a:ext>
             </a:extLst>
           </p:cNvPr>
@@ -6370,16 +6516,19 @@
           <p:nvPr/>
         </p:nvSpPr>
         <p:spPr>
-          <a:xfrm>
-            <a:off x="5347264" y="3769001"/>
-            <a:ext cx="1650327" cy="1951727"/>
+          <a:xfrm rot="19890488">
+            <a:off x="4631787" y="3915778"/>
+            <a:ext cx="3115831" cy="1001648"/>
           </a:xfrm>
           <a:prstGeom prst="rightArrow">
-            <a:avLst/>
+            <a:avLst>
+              <a:gd name="adj1" fmla="val 46494"/>
+              <a:gd name="adj2" fmla="val 89164"/>
+            </a:avLst>
           </a:prstGeom>
           <a:solidFill>
             <a:schemeClr val="bg2">
-              <a:lumMod val="50000"/>
+              <a:lumMod val="75000"/>
             </a:schemeClr>
           </a:solidFill>
           <a:ln>
@@ -6414,7 +6563,7 @@
     </p:spTree>
     <p:extLst>
       <p:ext uri="{BB962C8B-B14F-4D97-AF65-F5344CB8AC3E}">
-        <p14:creationId xmlns:p14="http://schemas.microsoft.com/office/powerpoint/2010/main" val="3180055076"/>
+        <p14:creationId xmlns:p14="http://schemas.microsoft.com/office/powerpoint/2010/main" val="2600024065"/>
       </p:ext>
     </p:extLst>
   </p:cSld>
@@ -6483,6 +6632,243 @@
         </p:nvSpPr>
         <p:spPr>
           <a:xfrm>
+            <a:off x="650450" y="2309567"/>
+            <a:ext cx="5444510" cy="461665"/>
+          </a:xfrm>
+          <a:prstGeom prst="rect">
+            <a:avLst/>
+          </a:prstGeom>
+          <a:noFill/>
+        </p:spPr>
+        <p:txBody>
+          <a:bodyPr wrap="square" rtlCol="0">
+            <a:spAutoFit/>
+          </a:bodyPr>
+          <a:lstStyle/>
+          <a:p>
+            <a:pPr marL="285750" indent="-285750">
+              <a:buFont typeface="Arial" panose="020B0604020202020204" pitchFamily="34" charset="0"/>
+              <a:buChar char="•"/>
+            </a:pPr>
+            <a:r>
+              <a:rPr lang="es-ES" sz="2400" dirty="0"/>
+              <a:t>Seguimos los pasos de instalación:</a:t>
+            </a:r>
+          </a:p>
+        </p:txBody>
+      </p:sp>
+      <p:pic>
+        <p:nvPicPr>
+          <p:cNvPr id="6" name="Imagen 5">
+            <a:extLst>
+              <a:ext uri="{FF2B5EF4-FFF2-40B4-BE49-F238E27FC236}">
+                <a16:creationId xmlns:a16="http://schemas.microsoft.com/office/drawing/2014/main" id="{4FA09AA6-8009-4C9D-BF21-395FC1E11BBC}"/>
+              </a:ext>
+            </a:extLst>
+          </p:cNvPr>
+          <p:cNvPicPr>
+            <a:picLocks noChangeAspect="1"/>
+          </p:cNvPicPr>
+          <p:nvPr/>
+        </p:nvPicPr>
+        <p:blipFill>
+          <a:blip r:embed="rId2"/>
+          <a:stretch>
+            <a:fillRect/>
+          </a:stretch>
+        </p:blipFill>
+        <p:spPr>
+          <a:xfrm>
+            <a:off x="509048" y="2922676"/>
+            <a:ext cx="4740051" cy="3665538"/>
+          </a:xfrm>
+          <a:prstGeom prst="roundRect">
+            <a:avLst>
+              <a:gd name="adj" fmla="val 3193"/>
+            </a:avLst>
+          </a:prstGeom>
+          <a:solidFill>
+            <a:srgbClr val="FFFFFF">
+              <a:shade val="85000"/>
+            </a:srgbClr>
+          </a:solidFill>
+          <a:ln>
+            <a:noFill/>
+          </a:ln>
+          <a:effectLst>
+            <a:reflection blurRad="12700" stA="38000" endPos="28000" dist="5000" dir="5400000" sy="-100000" algn="bl" rotWithShape="0"/>
+          </a:effectLst>
+        </p:spPr>
+      </p:pic>
+      <p:pic>
+        <p:nvPicPr>
+          <p:cNvPr id="8" name="Imagen 7">
+            <a:extLst>
+              <a:ext uri="{FF2B5EF4-FFF2-40B4-BE49-F238E27FC236}">
+                <a16:creationId xmlns:a16="http://schemas.microsoft.com/office/drawing/2014/main" id="{3F3C5E35-4D1B-443E-B4BC-F1DA43B68B84}"/>
+              </a:ext>
+            </a:extLst>
+          </p:cNvPr>
+          <p:cNvPicPr>
+            <a:picLocks noChangeAspect="1"/>
+          </p:cNvPicPr>
+          <p:nvPr/>
+        </p:nvPicPr>
+        <p:blipFill>
+          <a:blip r:embed="rId3"/>
+          <a:stretch>
+            <a:fillRect/>
+          </a:stretch>
+        </p:blipFill>
+        <p:spPr>
+          <a:xfrm>
+            <a:off x="7095756" y="2915905"/>
+            <a:ext cx="4701947" cy="3657917"/>
+          </a:xfrm>
+          <a:prstGeom prst="roundRect">
+            <a:avLst>
+              <a:gd name="adj" fmla="val 3440"/>
+            </a:avLst>
+          </a:prstGeom>
+          <a:solidFill>
+            <a:srgbClr val="FFFFFF">
+              <a:shade val="85000"/>
+            </a:srgbClr>
+          </a:solidFill>
+          <a:ln>
+            <a:noFill/>
+          </a:ln>
+          <a:effectLst>
+            <a:reflection blurRad="12700" stA="38000" endPos="28000" dist="5000" dir="5400000" sy="-100000" algn="bl" rotWithShape="0"/>
+          </a:effectLst>
+        </p:spPr>
+      </p:pic>
+      <p:sp>
+        <p:nvSpPr>
+          <p:cNvPr id="11" name="Flecha: a la derecha 10">
+            <a:extLst>
+              <a:ext uri="{FF2B5EF4-FFF2-40B4-BE49-F238E27FC236}">
+                <a16:creationId xmlns:a16="http://schemas.microsoft.com/office/drawing/2014/main" id="{2ADE3556-5D12-4BC8-93D7-4FC1F58BE9AD}"/>
+              </a:ext>
+            </a:extLst>
+          </p:cNvPr>
+          <p:cNvSpPr/>
+          <p:nvPr/>
+        </p:nvSpPr>
+        <p:spPr>
+          <a:xfrm>
+            <a:off x="5347264" y="3769001"/>
+            <a:ext cx="1650327" cy="1951727"/>
+          </a:xfrm>
+          <a:prstGeom prst="rightArrow">
+            <a:avLst/>
+          </a:prstGeom>
+          <a:solidFill>
+            <a:schemeClr val="bg2">
+              <a:lumMod val="50000"/>
+            </a:schemeClr>
+          </a:solidFill>
+          <a:ln>
+            <a:noFill/>
+          </a:ln>
+        </p:spPr>
+        <p:style>
+          <a:lnRef idx="2">
+            <a:schemeClr val="accent1">
+              <a:shade val="50000"/>
+            </a:schemeClr>
+          </a:lnRef>
+          <a:fillRef idx="1">
+            <a:schemeClr val="accent1"/>
+          </a:fillRef>
+          <a:effectRef idx="0">
+            <a:schemeClr val="accent1"/>
+          </a:effectRef>
+          <a:fontRef idx="minor">
+            <a:schemeClr val="lt1"/>
+          </a:fontRef>
+        </p:style>
+        <p:txBody>
+          <a:bodyPr rtlCol="0" anchor="ctr"/>
+          <a:lstStyle/>
+          <a:p>
+            <a:pPr algn="ctr"/>
+            <a:endParaRPr lang="es-ES"/>
+          </a:p>
+        </p:txBody>
+      </p:sp>
+    </p:spTree>
+    <p:extLst>
+      <p:ext uri="{BB962C8B-B14F-4D97-AF65-F5344CB8AC3E}">
+        <p14:creationId xmlns:p14="http://schemas.microsoft.com/office/powerpoint/2010/main" val="3180055076"/>
+      </p:ext>
+    </p:extLst>
+  </p:cSld>
+  <p:clrMapOvr>
+    <a:masterClrMapping/>
+  </p:clrMapOvr>
+</p:sld>
+</file>
+
+<file path=ppt/slides/slide7.xml><?xml version="1.0" encoding="utf-8"?>
+<p:sld xmlns:a="http://schemas.openxmlformats.org/drawingml/2006/main" xmlns:r="http://schemas.openxmlformats.org/officeDocument/2006/relationships" xmlns:p="http://schemas.openxmlformats.org/presentationml/2006/main">
+  <p:cSld>
+    <p:spTree>
+      <p:nvGrpSpPr>
+        <p:cNvPr id="1" name=""/>
+        <p:cNvGrpSpPr/>
+        <p:nvPr/>
+      </p:nvGrpSpPr>
+      <p:grpSpPr>
+        <a:xfrm>
+          <a:off x="0" y="0"/>
+          <a:ext cx="0" cy="0"/>
+          <a:chOff x="0" y="0"/>
+          <a:chExt cx="0" cy="0"/>
+        </a:xfrm>
+      </p:grpSpPr>
+      <p:sp>
+        <p:nvSpPr>
+          <p:cNvPr id="2" name="Título 1">
+            <a:extLst>
+              <a:ext uri="{FF2B5EF4-FFF2-40B4-BE49-F238E27FC236}">
+                <a16:creationId xmlns:a16="http://schemas.microsoft.com/office/drawing/2014/main" id="{31D8B7DB-44F2-420E-B492-E4870413ECFE}"/>
+              </a:ext>
+            </a:extLst>
+          </p:cNvPr>
+          <p:cNvSpPr>
+            <a:spLocks noGrp="1"/>
+          </p:cNvSpPr>
+          <p:nvPr>
+            <p:ph type="title"/>
+          </p:nvPr>
+        </p:nvSpPr>
+        <p:spPr/>
+        <p:txBody>
+          <a:bodyPr/>
+          <a:lstStyle/>
+          <a:p>
+            <a:r>
+              <a:rPr lang="es-ES" dirty="0"/>
+              <a:t>Pasos de la instalación</a:t>
+            </a:r>
+          </a:p>
+        </p:txBody>
+      </p:sp>
+      <p:sp>
+        <p:nvSpPr>
+          <p:cNvPr id="3" name="CuadroTexto 2">
+            <a:extLst>
+              <a:ext uri="{FF2B5EF4-FFF2-40B4-BE49-F238E27FC236}">
+                <a16:creationId xmlns:a16="http://schemas.microsoft.com/office/drawing/2014/main" id="{0068F14C-1799-4CF2-A91F-021E6510FAF4}"/>
+              </a:ext>
+            </a:extLst>
+          </p:cNvPr>
+          <p:cNvSpPr txBox="1"/>
+          <p:nvPr/>
+        </p:nvSpPr>
+        <p:spPr>
+          <a:xfrm>
             <a:off x="565609" y="2111604"/>
             <a:ext cx="7136090" cy="830997"/>
           </a:xfrm>
@@ -6599,7 +6985,7 @@
 </p:sld>
 </file>
 
-<file path=ppt/slides/slide7.xml><?xml version="1.0" encoding="utf-8"?>
+<file path=ppt/slides/slide8.xml><?xml version="1.0" encoding="utf-8"?>
 <p:sld xmlns:a="http://schemas.openxmlformats.org/drawingml/2006/main" xmlns:r="http://schemas.openxmlformats.org/officeDocument/2006/relationships" xmlns:p="http://schemas.openxmlformats.org/presentationml/2006/main">
   <p:cSld>
     <p:spTree>
@@ -6936,7 +7322,7 @@
 </p:sld>
 </file>
 
-<file path=ppt/slides/slide8.xml><?xml version="1.0" encoding="utf-8"?>
+<file path=ppt/slides/slide9.xml><?xml version="1.0" encoding="utf-8"?>
 <p:sld xmlns:a="http://schemas.openxmlformats.org/drawingml/2006/main" xmlns:r="http://schemas.openxmlformats.org/officeDocument/2006/relationships" xmlns:p="http://schemas.openxmlformats.org/presentationml/2006/main">
   <p:cSld>
     <p:spTree>
@@ -7256,141 +7642,6 @@
     <p:extLst>
       <p:ext uri="{BB962C8B-B14F-4D97-AF65-F5344CB8AC3E}">
         <p14:creationId xmlns:p14="http://schemas.microsoft.com/office/powerpoint/2010/main" val="1220701136"/>
-      </p:ext>
-    </p:extLst>
-  </p:cSld>
-  <p:clrMapOvr>
-    <a:masterClrMapping/>
-  </p:clrMapOvr>
-</p:sld>
-</file>
-
-<file path=ppt/slides/slide9.xml><?xml version="1.0" encoding="utf-8"?>
-<p:sld xmlns:a="http://schemas.openxmlformats.org/drawingml/2006/main" xmlns:r="http://schemas.openxmlformats.org/officeDocument/2006/relationships" xmlns:p="http://schemas.openxmlformats.org/presentationml/2006/main">
-  <p:cSld>
-    <p:spTree>
-      <p:nvGrpSpPr>
-        <p:cNvPr id="1" name=""/>
-        <p:cNvGrpSpPr/>
-        <p:nvPr/>
-      </p:nvGrpSpPr>
-      <p:grpSpPr>
-        <a:xfrm>
-          <a:off x="0" y="0"/>
-          <a:ext cx="0" cy="0"/>
-          <a:chOff x="0" y="0"/>
-          <a:chExt cx="0" cy="0"/>
-        </a:xfrm>
-      </p:grpSpPr>
-      <p:sp>
-        <p:nvSpPr>
-          <p:cNvPr id="2" name="Título 1">
-            <a:extLst>
-              <a:ext uri="{FF2B5EF4-FFF2-40B4-BE49-F238E27FC236}">
-                <a16:creationId xmlns:a16="http://schemas.microsoft.com/office/drawing/2014/main" id="{152712B1-5BFD-4504-A51F-5CBE8292E7CE}"/>
-              </a:ext>
-            </a:extLst>
-          </p:cNvPr>
-          <p:cNvSpPr>
-            <a:spLocks noGrp="1"/>
-          </p:cNvSpPr>
-          <p:nvPr>
-            <p:ph type="title"/>
-          </p:nvPr>
-        </p:nvSpPr>
-        <p:spPr/>
-        <p:txBody>
-          <a:bodyPr/>
-          <a:lstStyle/>
-          <a:p>
-            <a:r>
-              <a:rPr lang="es-ES" dirty="0"/>
-              <a:t>Métodos de arranque de la consola</a:t>
-            </a:r>
-          </a:p>
-        </p:txBody>
-      </p:sp>
-      <p:sp>
-        <p:nvSpPr>
-          <p:cNvPr id="4" name="CuadroTexto 3">
-            <a:extLst>
-              <a:ext uri="{FF2B5EF4-FFF2-40B4-BE49-F238E27FC236}">
-                <a16:creationId xmlns:a16="http://schemas.microsoft.com/office/drawing/2014/main" id="{5A00C913-5A53-4DD7-9622-A80006EE214C}"/>
-              </a:ext>
-            </a:extLst>
-          </p:cNvPr>
-          <p:cNvSpPr txBox="1"/>
-          <p:nvPr/>
-        </p:nvSpPr>
-        <p:spPr>
-          <a:xfrm>
-            <a:off x="181924" y="1914509"/>
-            <a:ext cx="11457751" cy="830997"/>
-          </a:xfrm>
-          <a:prstGeom prst="rect">
-            <a:avLst/>
-          </a:prstGeom>
-          <a:noFill/>
-        </p:spPr>
-        <p:txBody>
-          <a:bodyPr wrap="square" rtlCol="0">
-            <a:spAutoFit/>
-          </a:bodyPr>
-          <a:lstStyle/>
-          <a:p>
-            <a:r>
-              <a:rPr lang="es-ES" sz="2400" dirty="0"/>
-              <a:t>Cualquiera de las formas que uses, se debería abrir una ventana en nuestro navegador principal como esta:</a:t>
-            </a:r>
-          </a:p>
-        </p:txBody>
-      </p:sp>
-      <p:pic>
-        <p:nvPicPr>
-          <p:cNvPr id="9" name="Imagen 8">
-            <a:extLst>
-              <a:ext uri="{FF2B5EF4-FFF2-40B4-BE49-F238E27FC236}">
-                <a16:creationId xmlns:a16="http://schemas.microsoft.com/office/drawing/2014/main" id="{96AE7E4D-470D-4182-AD46-DF1E17FE9B67}"/>
-              </a:ext>
-            </a:extLst>
-          </p:cNvPr>
-          <p:cNvPicPr>
-            <a:picLocks noChangeAspect="1"/>
-          </p:cNvPicPr>
-          <p:nvPr/>
-        </p:nvPicPr>
-        <p:blipFill rotWithShape="1">
-          <a:blip r:embed="rId2"/>
-          <a:srcRect l="1009"/>
-          <a:stretch/>
-        </p:blipFill>
-        <p:spPr>
-          <a:xfrm>
-            <a:off x="3619892" y="2745506"/>
-            <a:ext cx="4581816" cy="3905105"/>
-          </a:xfrm>
-          <a:prstGeom prst="roundRect">
-            <a:avLst>
-              <a:gd name="adj" fmla="val 8594"/>
-            </a:avLst>
-          </a:prstGeom>
-          <a:solidFill>
-            <a:srgbClr val="FFFFFF">
-              <a:shade val="85000"/>
-            </a:srgbClr>
-          </a:solidFill>
-          <a:ln>
-            <a:noFill/>
-          </a:ln>
-          <a:effectLst>
-            <a:reflection blurRad="12700" stA="38000" endPos="28000" dist="5000" dir="5400000" sy="-100000" algn="bl" rotWithShape="0"/>
-          </a:effectLst>
-        </p:spPr>
-      </p:pic>
-    </p:spTree>
-    <p:extLst>
-      <p:ext uri="{BB962C8B-B14F-4D97-AF65-F5344CB8AC3E}">
-        <p14:creationId xmlns:p14="http://schemas.microsoft.com/office/powerpoint/2010/main" val="955749104"/>
       </p:ext>
     </p:extLst>
   </p:cSld>

</xml_diff>